<commit_message>
add and updated the whole course
</commit_message>
<xml_diff>
--- a/Grid/CSS Grid.pptx
+++ b/Grid/CSS Grid.pptx
@@ -12,10 +12,12 @@
     <p:sldId id="275" r:id="rId6"/>
     <p:sldId id="258" r:id="rId7"/>
     <p:sldId id="271" r:id="rId8"/>
-    <p:sldId id="278" r:id="rId9"/>
-    <p:sldId id="277" r:id="rId10"/>
-    <p:sldId id="281" r:id="rId11"/>
-    <p:sldId id="280" r:id="rId12"/>
+    <p:sldId id="283" r:id="rId9"/>
+    <p:sldId id="278" r:id="rId10"/>
+    <p:sldId id="277" r:id="rId11"/>
+    <p:sldId id="281" r:id="rId12"/>
+    <p:sldId id="280" r:id="rId13"/>
+    <p:sldId id="282" r:id="rId14"/>
   </p:sldIdLst>
   <p:sldSz cx="12192000" cy="6858000"/>
   <p:notesSz cx="6858000" cy="9144000"/>
@@ -308,7 +310,7 @@
           <a:p>
             <a:fld id="{AFB1F2BF-B7B4-4226-9CA1-57F2A70D198F}" type="datetimeFigureOut">
               <a:rPr lang="fr-CA" smtClean="0"/>
-              <a:t>2019-12-18</a:t>
+              <a:t>2019-12-31</a:t>
             </a:fld>
             <a:endParaRPr lang="fr-CA"/>
           </a:p>
@@ -583,7 +585,7 @@
           <a:p>
             <a:fld id="{AFB1F2BF-B7B4-4226-9CA1-57F2A70D198F}" type="datetimeFigureOut">
               <a:rPr lang="fr-CA" smtClean="0"/>
-              <a:t>2019-12-18</a:t>
+              <a:t>2019-12-31</a:t>
             </a:fld>
             <a:endParaRPr lang="fr-CA"/>
           </a:p>
@@ -777,7 +779,7 @@
           <a:p>
             <a:fld id="{AFB1F2BF-B7B4-4226-9CA1-57F2A70D198F}" type="datetimeFigureOut">
               <a:rPr lang="fr-CA" smtClean="0"/>
-              <a:t>2019-12-18</a:t>
+              <a:t>2019-12-31</a:t>
             </a:fld>
             <a:endParaRPr lang="fr-CA"/>
           </a:p>
@@ -1050,7 +1052,7 @@
           <a:p>
             <a:fld id="{AFB1F2BF-B7B4-4226-9CA1-57F2A70D198F}" type="datetimeFigureOut">
               <a:rPr lang="fr-CA" smtClean="0"/>
-              <a:t>2019-12-18</a:t>
+              <a:t>2019-12-31</a:t>
             </a:fld>
             <a:endParaRPr lang="fr-CA"/>
           </a:p>
@@ -1391,7 +1393,7 @@
           <a:p>
             <a:fld id="{AFB1F2BF-B7B4-4226-9CA1-57F2A70D198F}" type="datetimeFigureOut">
               <a:rPr lang="fr-CA" smtClean="0"/>
-              <a:t>2019-12-18</a:t>
+              <a:t>2019-12-31</a:t>
             </a:fld>
             <a:endParaRPr lang="fr-CA"/>
           </a:p>
@@ -2014,7 +2016,7 @@
           <a:p>
             <a:fld id="{AFB1F2BF-B7B4-4226-9CA1-57F2A70D198F}" type="datetimeFigureOut">
               <a:rPr lang="fr-CA" smtClean="0"/>
-              <a:t>2019-12-18</a:t>
+              <a:t>2019-12-31</a:t>
             </a:fld>
             <a:endParaRPr lang="fr-CA"/>
           </a:p>
@@ -2874,7 +2876,7 @@
           <a:p>
             <a:fld id="{AFB1F2BF-B7B4-4226-9CA1-57F2A70D198F}" type="datetimeFigureOut">
               <a:rPr lang="fr-CA" smtClean="0"/>
-              <a:t>2019-12-18</a:t>
+              <a:t>2019-12-31</a:t>
             </a:fld>
             <a:endParaRPr lang="fr-CA"/>
           </a:p>
@@ -3044,7 +3046,7 @@
           <a:p>
             <a:fld id="{AFB1F2BF-B7B4-4226-9CA1-57F2A70D198F}" type="datetimeFigureOut">
               <a:rPr lang="fr-CA" smtClean="0"/>
-              <a:t>2019-12-18</a:t>
+              <a:t>2019-12-31</a:t>
             </a:fld>
             <a:endParaRPr lang="fr-CA"/>
           </a:p>
@@ -3224,7 +3226,7 @@
           <a:p>
             <a:fld id="{AFB1F2BF-B7B4-4226-9CA1-57F2A70D198F}" type="datetimeFigureOut">
               <a:rPr lang="fr-CA" smtClean="0"/>
-              <a:t>2019-12-18</a:t>
+              <a:t>2019-12-31</a:t>
             </a:fld>
             <a:endParaRPr lang="fr-CA"/>
           </a:p>
@@ -3394,7 +3396,7 @@
           <a:p>
             <a:fld id="{AFB1F2BF-B7B4-4226-9CA1-57F2A70D198F}" type="datetimeFigureOut">
               <a:rPr lang="fr-CA" smtClean="0"/>
-              <a:t>2019-12-18</a:t>
+              <a:t>2019-12-31</a:t>
             </a:fld>
             <a:endParaRPr lang="fr-CA"/>
           </a:p>
@@ -3641,7 +3643,7 @@
           <a:p>
             <a:fld id="{AFB1F2BF-B7B4-4226-9CA1-57F2A70D198F}" type="datetimeFigureOut">
               <a:rPr lang="fr-CA" smtClean="0"/>
-              <a:t>2019-12-18</a:t>
+              <a:t>2019-12-31</a:t>
             </a:fld>
             <a:endParaRPr lang="fr-CA"/>
           </a:p>
@@ -3933,7 +3935,7 @@
           <a:p>
             <a:fld id="{AFB1F2BF-B7B4-4226-9CA1-57F2A70D198F}" type="datetimeFigureOut">
               <a:rPr lang="fr-CA" smtClean="0"/>
-              <a:t>2019-12-18</a:t>
+              <a:t>2019-12-31</a:t>
             </a:fld>
             <a:endParaRPr lang="fr-CA"/>
           </a:p>
@@ -4377,7 +4379,7 @@
           <a:p>
             <a:fld id="{AFB1F2BF-B7B4-4226-9CA1-57F2A70D198F}" type="datetimeFigureOut">
               <a:rPr lang="fr-CA" smtClean="0"/>
-              <a:t>2019-12-18</a:t>
+              <a:t>2019-12-31</a:t>
             </a:fld>
             <a:endParaRPr lang="fr-CA"/>
           </a:p>
@@ -4495,7 +4497,7 @@
           <a:p>
             <a:fld id="{AFB1F2BF-B7B4-4226-9CA1-57F2A70D198F}" type="datetimeFigureOut">
               <a:rPr lang="fr-CA" smtClean="0"/>
-              <a:t>2019-12-18</a:t>
+              <a:t>2019-12-31</a:t>
             </a:fld>
             <a:endParaRPr lang="fr-CA"/>
           </a:p>
@@ -4590,7 +4592,7 @@
           <a:p>
             <a:fld id="{AFB1F2BF-B7B4-4226-9CA1-57F2A70D198F}" type="datetimeFigureOut">
               <a:rPr lang="fr-CA" smtClean="0"/>
-              <a:t>2019-12-18</a:t>
+              <a:t>2019-12-31</a:t>
             </a:fld>
             <a:endParaRPr lang="fr-CA"/>
           </a:p>
@@ -4869,7 +4871,7 @@
           <a:p>
             <a:fld id="{AFB1F2BF-B7B4-4226-9CA1-57F2A70D198F}" type="datetimeFigureOut">
               <a:rPr lang="fr-CA" smtClean="0"/>
-              <a:t>2019-12-18</a:t>
+              <a:t>2019-12-31</a:t>
             </a:fld>
             <a:endParaRPr lang="fr-CA"/>
           </a:p>
@@ -5144,7 +5146,7 @@
           <a:p>
             <a:fld id="{AFB1F2BF-B7B4-4226-9CA1-57F2A70D198F}" type="datetimeFigureOut">
               <a:rPr lang="fr-CA" smtClean="0"/>
-              <a:t>2019-12-18</a:t>
+              <a:t>2019-12-31</a:t>
             </a:fld>
             <a:endParaRPr lang="fr-CA"/>
           </a:p>
@@ -5573,7 +5575,7 @@
           <a:p>
             <a:fld id="{AFB1F2BF-B7B4-4226-9CA1-57F2A70D198F}" type="datetimeFigureOut">
               <a:rPr lang="fr-CA" smtClean="0"/>
-              <a:t>2019-12-18</a:t>
+              <a:t>2019-12-31</a:t>
             </a:fld>
             <a:endParaRPr lang="fr-CA"/>
           </a:p>
@@ -6191,7 +6193,7 @@
           <p:cNvPr id="2" name="Titre 1">
             <a:extLst>
               <a:ext uri="{FF2B5EF4-FFF2-40B4-BE49-F238E27FC236}">
-                <a16:creationId xmlns:a16="http://schemas.microsoft.com/office/drawing/2014/main" id="{6301694F-C650-4A31-83CA-3FF41BAECFFF}"/>
+                <a16:creationId xmlns:a16="http://schemas.microsoft.com/office/drawing/2014/main" id="{87149E10-A35F-4C63-B58C-310E89A08042}"/>
               </a:ext>
             </a:extLst>
           </p:cNvPr>
@@ -6204,29 +6206,26 @@
         </p:nvSpPr>
         <p:spPr>
           <a:xfrm>
-            <a:off x="838200" y="365126"/>
-            <a:ext cx="10515600" cy="773562"/>
+            <a:off x="838200" y="267419"/>
+            <a:ext cx="10515600" cy="733245"/>
           </a:xfrm>
         </p:spPr>
         <p:txBody>
           <a:bodyPr>
-            <a:normAutofit/>
+            <a:noAutofit/>
           </a:bodyPr>
           <a:lstStyle/>
           <a:p>
             <a:pPr algn="ctr"/>
             <a:r>
-              <a:rPr lang="fr-CA" sz="4400" dirty="0" err="1">
-                <a:latin typeface="Calibri" panose="020F0502020204030204" pitchFamily="34" charset="0"/>
-              </a:rPr>
-              <a:t>Grid</a:t>
-            </a:r>
-            <a:r>
-              <a:rPr lang="fr-CA" sz="4400" dirty="0">
-                <a:latin typeface="Calibri" panose="020F0502020204030204" pitchFamily="34" charset="0"/>
-              </a:rPr>
-              <a:t> vs. Flexbox</a:t>
-            </a:r>
+              <a:rPr lang="en-US" sz="4400" dirty="0">
+                <a:latin typeface="Calibri" panose="020F0502020204030204" pitchFamily="34" charset="0"/>
+              </a:rPr>
+              <a:t>Image grid</a:t>
+            </a:r>
+            <a:endParaRPr lang="fr-CA" sz="4400" dirty="0">
+              <a:latin typeface="Calibri" panose="020F0502020204030204" pitchFamily="34" charset="0"/>
+            </a:endParaRPr>
           </a:p>
         </p:txBody>
       </p:sp>
@@ -6235,7 +6234,7 @@
           <p:cNvPr id="3" name="Espace réservé du contenu 2">
             <a:extLst>
               <a:ext uri="{FF2B5EF4-FFF2-40B4-BE49-F238E27FC236}">
-                <a16:creationId xmlns:a16="http://schemas.microsoft.com/office/drawing/2014/main" id="{29AE6743-BCEE-41F1-9628-602E51B489E5}"/>
+                <a16:creationId xmlns:a16="http://schemas.microsoft.com/office/drawing/2014/main" id="{85DC1803-F7EB-4A7D-913E-1556C0EA81C2}"/>
               </a:ext>
             </a:extLst>
           </p:cNvPr>
@@ -6248,13 +6247,13 @@
         </p:nvSpPr>
         <p:spPr>
           <a:xfrm>
-            <a:off x="838200" y="1811547"/>
-            <a:ext cx="5181600" cy="4365416"/>
+            <a:off x="270296" y="1276709"/>
+            <a:ext cx="6320286" cy="5451893"/>
           </a:xfrm>
         </p:spPr>
         <p:txBody>
           <a:bodyPr>
-            <a:normAutofit lnSpcReduction="10000"/>
+            <a:normAutofit fontScale="55000" lnSpcReduction="20000"/>
           </a:bodyPr>
           <a:lstStyle/>
           <a:p>
@@ -6262,22 +6261,10 @@
               <a:buNone/>
             </a:pPr>
             <a:r>
-              <a:rPr lang="fr-CA" sz="3500" dirty="0">
-                <a:latin typeface="Calibri" panose="020F0502020204030204" pitchFamily="34" charset="0"/>
-              </a:rPr>
-              <a:t>.header &gt; </a:t>
-            </a:r>
-            <a:r>
-              <a:rPr lang="fr-CA" sz="3500" dirty="0" err="1">
-                <a:latin typeface="Calibri" panose="020F0502020204030204" pitchFamily="34" charset="0"/>
-              </a:rPr>
-              <a:t>div:nth-child</a:t>
-            </a:r>
-            <a:r>
-              <a:rPr lang="fr-CA" sz="3500" dirty="0">
-                <a:latin typeface="Calibri" panose="020F0502020204030204" pitchFamily="34" charset="0"/>
-              </a:rPr>
-              <a:t>(3) {</a:t>
+              <a:rPr lang="fr-CA" sz="5100" dirty="0">
+                <a:latin typeface="Calibri" panose="020F0502020204030204" pitchFamily="34" charset="0"/>
+              </a:rPr>
+              <a:t>.container {</a:t>
             </a:r>
           </a:p>
           <a:p>
@@ -6285,22 +6272,63 @@
               <a:buNone/>
             </a:pPr>
             <a:r>
-              <a:rPr lang="fr-CA" sz="3500" dirty="0">
+              <a:rPr lang="fr-CA" sz="5100" dirty="0">
+                <a:latin typeface="Calibri" panose="020F0502020204030204" pitchFamily="34" charset="0"/>
+              </a:rPr>
+              <a:t>	display: </a:t>
+            </a:r>
+            <a:r>
+              <a:rPr lang="fr-CA" sz="5100" dirty="0" err="1">
+                <a:solidFill>
+                  <a:srgbClr val="00B0F0"/>
+                </a:solidFill>
+                <a:latin typeface="Calibri" panose="020F0502020204030204" pitchFamily="34" charset="0"/>
+              </a:rPr>
+              <a:t>grid</a:t>
+            </a:r>
+            <a:r>
+              <a:rPr lang="fr-CA" sz="5100" dirty="0">
+                <a:latin typeface="Calibri" panose="020F0502020204030204" pitchFamily="34" charset="0"/>
+              </a:rPr>
+              <a:t>;</a:t>
+            </a:r>
+          </a:p>
+          <a:p>
+            <a:pPr marL="0" indent="0">
+              <a:buNone/>
+            </a:pPr>
+            <a:r>
+              <a:rPr lang="fr-CA" sz="5100" dirty="0">
+                <a:solidFill>
+                  <a:srgbClr val="00B0F0"/>
+                </a:solidFill>
                 <a:latin typeface="Calibri" panose="020F0502020204030204" pitchFamily="34" charset="0"/>
               </a:rPr>
               <a:t>	</a:t>
             </a:r>
             <a:r>
-              <a:rPr lang="fr-CA" sz="3500" dirty="0" err="1">
-                <a:latin typeface="Calibri" panose="020F0502020204030204" pitchFamily="34" charset="0"/>
-              </a:rPr>
-              <a:t>margin-left</a:t>
-            </a:r>
-            <a:r>
-              <a:rPr lang="fr-CA" sz="3500" dirty="0">
-                <a:latin typeface="Calibri" panose="020F0502020204030204" pitchFamily="34" charset="0"/>
-              </a:rPr>
-              <a:t>: auto;</a:t>
+              <a:rPr lang="fr-CA" sz="5100" dirty="0" err="1">
+                <a:solidFill>
+                  <a:srgbClr val="00B0F0"/>
+                </a:solidFill>
+                <a:latin typeface="Calibri" panose="020F0502020204030204" pitchFamily="34" charset="0"/>
+              </a:rPr>
+              <a:t>grid</a:t>
+            </a:r>
+            <a:r>
+              <a:rPr lang="fr-CA" sz="5100" dirty="0">
+                <a:solidFill>
+                  <a:srgbClr val="00B0F0"/>
+                </a:solidFill>
+                <a:latin typeface="Calibri" panose="020F0502020204030204" pitchFamily="34" charset="0"/>
+              </a:rPr>
+              <a:t>-gap</a:t>
+            </a:r>
+            <a:r>
+              <a:rPr lang="fr-CA" sz="5100" dirty="0">
+                <a:latin typeface="Calibri" panose="020F0502020204030204" pitchFamily="34" charset="0"/>
+              </a:rPr>
+              <a:t>: 5px;</a:t>
             </a:r>
           </a:p>
           <a:p>
@@ -6308,7 +6336,145 @@
               <a:buNone/>
             </a:pPr>
             <a:r>
-              <a:rPr lang="fr-CA" sz="3500" dirty="0">
+              <a:rPr lang="fr-CA" sz="5100" dirty="0">
+                <a:solidFill>
+                  <a:srgbClr val="00B0F0"/>
+                </a:solidFill>
+                <a:latin typeface="Calibri" panose="020F0502020204030204" pitchFamily="34" charset="0"/>
+              </a:rPr>
+              <a:t>	</a:t>
+            </a:r>
+            <a:r>
+              <a:rPr lang="fr-CA" sz="5100" dirty="0" err="1">
+                <a:solidFill>
+                  <a:srgbClr val="00B0F0"/>
+                </a:solidFill>
+                <a:latin typeface="Calibri" panose="020F0502020204030204" pitchFamily="34" charset="0"/>
+              </a:rPr>
+              <a:t>grid-template-columns</a:t>
+            </a:r>
+            <a:r>
+              <a:rPr lang="fr-CA" sz="5100" dirty="0">
+                <a:latin typeface="Calibri" panose="020F0502020204030204" pitchFamily="34" charset="0"/>
+              </a:rPr>
+              <a:t>: </a:t>
+            </a:r>
+            <a:r>
+              <a:rPr lang="fr-CA" sz="5100" dirty="0" err="1">
+                <a:latin typeface="Calibri" panose="020F0502020204030204" pitchFamily="34" charset="0"/>
+              </a:rPr>
+              <a:t>repeat</a:t>
+            </a:r>
+            <a:r>
+              <a:rPr lang="fr-CA" sz="5100" dirty="0">
+                <a:latin typeface="Calibri" panose="020F0502020204030204" pitchFamily="34" charset="0"/>
+              </a:rPr>
+              <a:t>(auto-fit, 	</a:t>
+            </a:r>
+            <a:r>
+              <a:rPr lang="fr-CA" sz="5100" dirty="0" err="1">
+                <a:latin typeface="Calibri" panose="020F0502020204030204" pitchFamily="34" charset="0"/>
+              </a:rPr>
+              <a:t>minmax</a:t>
+            </a:r>
+            <a:r>
+              <a:rPr lang="fr-CA" sz="5100" dirty="0">
+                <a:latin typeface="Calibri" panose="020F0502020204030204" pitchFamily="34" charset="0"/>
+              </a:rPr>
+              <a:t>(100px, 1fr));</a:t>
+            </a:r>
+          </a:p>
+          <a:p>
+            <a:pPr marL="0" indent="0">
+              <a:buNone/>
+            </a:pPr>
+            <a:r>
+              <a:rPr lang="fr-CA" sz="5100" dirty="0">
+                <a:solidFill>
+                  <a:srgbClr val="00B0F0"/>
+                </a:solidFill>
+                <a:latin typeface="Calibri" panose="020F0502020204030204" pitchFamily="34" charset="0"/>
+              </a:rPr>
+              <a:t>	</a:t>
+            </a:r>
+            <a:r>
+              <a:rPr lang="fr-CA" sz="5100" dirty="0" err="1">
+                <a:solidFill>
+                  <a:srgbClr val="00B0F0"/>
+                </a:solidFill>
+                <a:latin typeface="Calibri" panose="020F0502020204030204" pitchFamily="34" charset="0"/>
+              </a:rPr>
+              <a:t>grid</a:t>
+            </a:r>
+            <a:r>
+              <a:rPr lang="fr-CA" sz="5100" dirty="0">
+                <a:solidFill>
+                  <a:srgbClr val="00B0F0"/>
+                </a:solidFill>
+                <a:latin typeface="Calibri" panose="020F0502020204030204" pitchFamily="34" charset="0"/>
+              </a:rPr>
+              <a:t>-auto-</a:t>
+            </a:r>
+            <a:r>
+              <a:rPr lang="fr-CA" sz="5100" dirty="0" err="1">
+                <a:solidFill>
+                  <a:srgbClr val="00B0F0"/>
+                </a:solidFill>
+                <a:latin typeface="Calibri" panose="020F0502020204030204" pitchFamily="34" charset="0"/>
+              </a:rPr>
+              <a:t>rows</a:t>
+            </a:r>
+            <a:r>
+              <a:rPr lang="fr-CA" sz="5100" dirty="0">
+                <a:latin typeface="Calibri" panose="020F0502020204030204" pitchFamily="34" charset="0"/>
+              </a:rPr>
+              <a:t>: 75px;</a:t>
+            </a:r>
+          </a:p>
+          <a:p>
+            <a:pPr marL="0" indent="0">
+              <a:buNone/>
+            </a:pPr>
+            <a:r>
+              <a:rPr lang="fr-CA" sz="5100" dirty="0">
+                <a:solidFill>
+                  <a:srgbClr val="00B0F0"/>
+                </a:solidFill>
+                <a:latin typeface="Calibri" panose="020F0502020204030204" pitchFamily="34" charset="0"/>
+              </a:rPr>
+              <a:t>	</a:t>
+            </a:r>
+            <a:r>
+              <a:rPr lang="fr-CA" sz="5100" dirty="0" err="1">
+                <a:solidFill>
+                  <a:srgbClr val="00B0F0"/>
+                </a:solidFill>
+                <a:latin typeface="Calibri" panose="020F0502020204030204" pitchFamily="34" charset="0"/>
+              </a:rPr>
+              <a:t>grid</a:t>
+            </a:r>
+            <a:r>
+              <a:rPr lang="fr-CA" sz="5100" dirty="0">
+                <a:solidFill>
+                  <a:srgbClr val="00B0F0"/>
+                </a:solidFill>
+                <a:latin typeface="Calibri" panose="020F0502020204030204" pitchFamily="34" charset="0"/>
+              </a:rPr>
+              <a:t>-auto-flow</a:t>
+            </a:r>
+            <a:r>
+              <a:rPr lang="fr-CA" sz="5100" dirty="0">
+                <a:latin typeface="Calibri" panose="020F0502020204030204" pitchFamily="34" charset="0"/>
+              </a:rPr>
+              <a:t>: dense;</a:t>
+            </a:r>
+          </a:p>
+          <a:p>
+            <a:pPr marL="0" indent="0">
+              <a:buNone/>
+            </a:pPr>
+            <a:r>
+              <a:rPr lang="fr-CA" sz="5100" dirty="0">
                 <a:latin typeface="Calibri" panose="020F0502020204030204" pitchFamily="34" charset="0"/>
               </a:rPr>
               <a:t>}</a:t>
@@ -6319,15 +6485,15 @@
               <a:buNone/>
             </a:pPr>
             <a:br>
-              <a:rPr lang="fr-CA" sz="3500" dirty="0">
+              <a:rPr lang="fr-CA" sz="5100" dirty="0">
                 <a:latin typeface="Calibri" panose="020F0502020204030204" pitchFamily="34" charset="0"/>
               </a:rPr>
             </a:br>
             <a:r>
-              <a:rPr lang="fr-CA" sz="3500" dirty="0">
-                <a:latin typeface="Calibri" panose="020F0502020204030204" pitchFamily="34" charset="0"/>
-              </a:rPr>
-              <a:t>.menu {</a:t>
+              <a:rPr lang="fr-CA" sz="5100" dirty="0">
+                <a:latin typeface="Calibri" panose="020F0502020204030204" pitchFamily="34" charset="0"/>
+              </a:rPr>
+              <a:t>.horizontal {</a:t>
             </a:r>
           </a:p>
           <a:p>
@@ -6335,22 +6501,40 @@
               <a:buNone/>
             </a:pPr>
             <a:r>
-              <a:rPr lang="fr-CA" sz="3500" dirty="0">
+              <a:rPr lang="fr-CA" sz="5100" dirty="0">
+                <a:solidFill>
+                  <a:srgbClr val="00B0F0"/>
+                </a:solidFill>
                 <a:latin typeface="Calibri" panose="020F0502020204030204" pitchFamily="34" charset="0"/>
               </a:rPr>
               <a:t>	</a:t>
             </a:r>
             <a:r>
-              <a:rPr lang="fr-CA" sz="3500" dirty="0" err="1">
+              <a:rPr lang="fr-CA" sz="5100" dirty="0" err="1">
+                <a:solidFill>
+                  <a:srgbClr val="00B0F0"/>
+                </a:solidFill>
                 <a:latin typeface="Calibri" panose="020F0502020204030204" pitchFamily="34" charset="0"/>
               </a:rPr>
               <a:t>grid-column</a:t>
             </a:r>
             <a:r>
-              <a:rPr lang="fr-CA" sz="3500" dirty="0">
-                <a:latin typeface="Calibri" panose="020F0502020204030204" pitchFamily="34" charset="0"/>
-              </a:rPr>
-              <a:t>: 1 / 2;</a:t>
+              <a:rPr lang="fr-CA" sz="5100" dirty="0">
+                <a:latin typeface="Calibri" panose="020F0502020204030204" pitchFamily="34" charset="0"/>
+              </a:rPr>
+              <a:t>: </a:t>
+            </a:r>
+            <a:r>
+              <a:rPr lang="fr-CA" sz="5100" dirty="0" err="1">
+                <a:latin typeface="Calibri" panose="020F0502020204030204" pitchFamily="34" charset="0"/>
+              </a:rPr>
+              <a:t>span</a:t>
+            </a:r>
+            <a:r>
+              <a:rPr lang="fr-CA" sz="5100" dirty="0">
+                <a:latin typeface="Calibri" panose="020F0502020204030204" pitchFamily="34" charset="0"/>
+              </a:rPr>
+              <a:t> 2;</a:t>
             </a:r>
           </a:p>
           <a:p>
@@ -6358,7 +6542,7 @@
               <a:buNone/>
             </a:pPr>
             <a:r>
-              <a:rPr lang="fr-CA" sz="3500" dirty="0">
+              <a:rPr lang="fr-CA" sz="5100" dirty="0">
                 <a:latin typeface="Calibri" panose="020F0502020204030204" pitchFamily="34" charset="0"/>
               </a:rPr>
               <a:t>}</a:t>
@@ -6374,7 +6558,7 @@
           <p:cNvPr id="4" name="Espace réservé du contenu 3">
             <a:extLst>
               <a:ext uri="{FF2B5EF4-FFF2-40B4-BE49-F238E27FC236}">
-                <a16:creationId xmlns:a16="http://schemas.microsoft.com/office/drawing/2014/main" id="{47629136-0AA8-4981-8D69-8603C16F295C}"/>
+                <a16:creationId xmlns:a16="http://schemas.microsoft.com/office/drawing/2014/main" id="{A6075F6B-44F4-40AC-B977-763172916C1F}"/>
               </a:ext>
             </a:extLst>
           </p:cNvPr>
@@ -6387,13 +6571,13 @@
         </p:nvSpPr>
         <p:spPr>
           <a:xfrm>
-            <a:off x="7073660" y="1811547"/>
-            <a:ext cx="4520242" cy="4365416"/>
+            <a:off x="6763110" y="1431985"/>
+            <a:ext cx="5158596" cy="5296618"/>
           </a:xfrm>
         </p:spPr>
         <p:txBody>
           <a:bodyPr>
-            <a:normAutofit lnSpcReduction="10000"/>
+            <a:normAutofit fontScale="55000" lnSpcReduction="20000"/>
           </a:bodyPr>
           <a:lstStyle/>
           <a:p>
@@ -6401,10 +6585,10 @@
               <a:buNone/>
             </a:pPr>
             <a:r>
-              <a:rPr lang="fr-CA" sz="3200" dirty="0">
-                <a:latin typeface="Calibri" panose="020F0502020204030204" pitchFamily="34" charset="0"/>
-              </a:rPr>
-              <a:t>.content {</a:t>
+              <a:rPr lang="fr-CA" sz="5800" dirty="0">
+                <a:latin typeface="Calibri" panose="020F0502020204030204" pitchFamily="34" charset="0"/>
+              </a:rPr>
+              <a:t>.vertical {</a:t>
             </a:r>
           </a:p>
           <a:p>
@@ -6412,22 +6596,111 @@
               <a:buNone/>
             </a:pPr>
             <a:r>
-              <a:rPr lang="fr-CA" sz="3200" dirty="0">
+              <a:rPr lang="fr-CA" sz="5800" dirty="0">
+                <a:solidFill>
+                  <a:srgbClr val="00B0F0"/>
+                </a:solidFill>
                 <a:latin typeface="Calibri" panose="020F0502020204030204" pitchFamily="34" charset="0"/>
               </a:rPr>
               <a:t>	</a:t>
             </a:r>
             <a:r>
-              <a:rPr lang="fr-CA" sz="3200" dirty="0" err="1">
+              <a:rPr lang="fr-CA" sz="5800" dirty="0" err="1">
+                <a:solidFill>
+                  <a:srgbClr val="00B0F0"/>
+                </a:solidFill>
+                <a:latin typeface="Calibri" panose="020F0502020204030204" pitchFamily="34" charset="0"/>
+              </a:rPr>
+              <a:t>grid-row</a:t>
+            </a:r>
+            <a:r>
+              <a:rPr lang="fr-CA" sz="5800" dirty="0">
+                <a:latin typeface="Calibri" panose="020F0502020204030204" pitchFamily="34" charset="0"/>
+              </a:rPr>
+              <a:t>: </a:t>
+            </a:r>
+            <a:r>
+              <a:rPr lang="fr-CA" sz="5800" dirty="0" err="1">
+                <a:latin typeface="Calibri" panose="020F0502020204030204" pitchFamily="34" charset="0"/>
+              </a:rPr>
+              <a:t>span</a:t>
+            </a:r>
+            <a:r>
+              <a:rPr lang="fr-CA" sz="5800" dirty="0">
+                <a:latin typeface="Calibri" panose="020F0502020204030204" pitchFamily="34" charset="0"/>
+              </a:rPr>
+              <a:t> 2;</a:t>
+            </a:r>
+          </a:p>
+          <a:p>
+            <a:pPr marL="0" indent="0">
+              <a:buNone/>
+            </a:pPr>
+            <a:r>
+              <a:rPr lang="fr-CA" sz="5800" dirty="0">
+                <a:latin typeface="Calibri" panose="020F0502020204030204" pitchFamily="34" charset="0"/>
+              </a:rPr>
+              <a:t>}</a:t>
+            </a:r>
+          </a:p>
+          <a:p>
+            <a:pPr marL="0" indent="0">
+              <a:buNone/>
+            </a:pPr>
+            <a:br>
+              <a:rPr lang="fr-CA" sz="5800" dirty="0">
+                <a:latin typeface="Calibri" panose="020F0502020204030204" pitchFamily="34" charset="0"/>
+              </a:rPr>
+            </a:br>
+            <a:r>
+              <a:rPr lang="fr-CA" sz="5800" dirty="0">
+                <a:latin typeface="Calibri" panose="020F0502020204030204" pitchFamily="34" charset="0"/>
+              </a:rPr>
+              <a:t>.big {</a:t>
+            </a:r>
+          </a:p>
+          <a:p>
+            <a:pPr marL="0" indent="0">
+              <a:buNone/>
+            </a:pPr>
+            <a:r>
+              <a:rPr lang="fr-CA" sz="5800" dirty="0">
+                <a:solidFill>
+                  <a:srgbClr val="00B0F0"/>
+                </a:solidFill>
+                <a:latin typeface="Calibri" panose="020F0502020204030204" pitchFamily="34" charset="0"/>
+              </a:rPr>
+              <a:t>	</a:t>
+            </a:r>
+            <a:r>
+              <a:rPr lang="fr-CA" sz="5800" dirty="0" err="1">
+                <a:solidFill>
+                  <a:srgbClr val="00B0F0"/>
+                </a:solidFill>
                 <a:latin typeface="Calibri" panose="020F0502020204030204" pitchFamily="34" charset="0"/>
               </a:rPr>
               <a:t>grid-column</a:t>
             </a:r>
             <a:r>
-              <a:rPr lang="fr-CA" sz="3200" dirty="0">
-                <a:latin typeface="Calibri" panose="020F0502020204030204" pitchFamily="34" charset="0"/>
-              </a:rPr>
-              <a:t>: 2 / -1;</a:t>
+              <a:rPr lang="fr-CA" sz="5800" dirty="0">
+                <a:solidFill>
+                  <a:srgbClr val="00B0F0"/>
+                </a:solidFill>
+                <a:latin typeface="Calibri" panose="020F0502020204030204" pitchFamily="34" charset="0"/>
+              </a:rPr>
+              <a:t>: </a:t>
+            </a:r>
+            <a:r>
+              <a:rPr lang="fr-CA" sz="5800" dirty="0" err="1">
+                <a:latin typeface="Calibri" panose="020F0502020204030204" pitchFamily="34" charset="0"/>
+              </a:rPr>
+              <a:t>span</a:t>
+            </a:r>
+            <a:r>
+              <a:rPr lang="fr-CA" sz="5800" dirty="0">
+                <a:latin typeface="Calibri" panose="020F0502020204030204" pitchFamily="34" charset="0"/>
+              </a:rPr>
+              <a:t> 2;</a:t>
             </a:r>
           </a:p>
           <a:p>
@@ -6435,69 +6708,48 @@
               <a:buNone/>
             </a:pPr>
             <a:r>
-              <a:rPr lang="fr-CA" sz="3200" dirty="0">
-                <a:latin typeface="Calibri" panose="020F0502020204030204" pitchFamily="34" charset="0"/>
-              </a:rPr>
-              <a:t>}</a:t>
+              <a:rPr lang="fr-CA" sz="5800" dirty="0">
+                <a:solidFill>
+                  <a:srgbClr val="00B0F0"/>
+                </a:solidFill>
+                <a:latin typeface="Calibri" panose="020F0502020204030204" pitchFamily="34" charset="0"/>
+              </a:rPr>
+              <a:t>	</a:t>
+            </a:r>
+            <a:r>
+              <a:rPr lang="fr-CA" sz="5800" dirty="0" err="1">
+                <a:solidFill>
+                  <a:srgbClr val="00B0F0"/>
+                </a:solidFill>
+                <a:latin typeface="Calibri" panose="020F0502020204030204" pitchFamily="34" charset="0"/>
+              </a:rPr>
+              <a:t>grid-row</a:t>
+            </a:r>
+            <a:r>
+              <a:rPr lang="fr-CA" sz="5800" dirty="0">
+                <a:latin typeface="Calibri" panose="020F0502020204030204" pitchFamily="34" charset="0"/>
+              </a:rPr>
+              <a:t>: </a:t>
+            </a:r>
+            <a:r>
+              <a:rPr lang="fr-CA" sz="5800" dirty="0" err="1">
+                <a:latin typeface="Calibri" panose="020F0502020204030204" pitchFamily="34" charset="0"/>
+              </a:rPr>
+              <a:t>span</a:t>
+            </a:r>
+            <a:r>
+              <a:rPr lang="fr-CA" sz="5800" dirty="0">
+                <a:latin typeface="Calibri" panose="020F0502020204030204" pitchFamily="34" charset="0"/>
+              </a:rPr>
+              <a:t> 2;</a:t>
             </a:r>
           </a:p>
           <a:p>
             <a:pPr marL="0" indent="0">
               <a:buNone/>
             </a:pPr>
-            <a:br>
-              <a:rPr lang="fr-CA" sz="3200" dirty="0">
-                <a:latin typeface="Calibri" panose="020F0502020204030204" pitchFamily="34" charset="0"/>
-              </a:rPr>
-            </a:br>
-            <a:r>
-              <a:rPr lang="fr-CA" sz="3200" dirty="0">
-                <a:latin typeface="Calibri" panose="020F0502020204030204" pitchFamily="34" charset="0"/>
-              </a:rPr>
-              <a:t>.</a:t>
-            </a:r>
-            <a:r>
-              <a:rPr lang="fr-CA" sz="3200" dirty="0" err="1">
-                <a:latin typeface="Calibri" panose="020F0502020204030204" pitchFamily="34" charset="0"/>
-              </a:rPr>
-              <a:t>footer</a:t>
-            </a:r>
-            <a:r>
-              <a:rPr lang="fr-CA" sz="3200" dirty="0">
-                <a:latin typeface="Calibri" panose="020F0502020204030204" pitchFamily="34" charset="0"/>
-              </a:rPr>
-              <a:t> {</a:t>
-            </a:r>
-          </a:p>
-          <a:p>
-            <a:pPr marL="0" indent="0">
-              <a:buNone/>
-            </a:pPr>
-            <a:r>
-              <a:rPr lang="fr-CA" sz="3200" dirty="0">
-                <a:latin typeface="Calibri" panose="020F0502020204030204" pitchFamily="34" charset="0"/>
-              </a:rPr>
-              <a:t>	</a:t>
-            </a:r>
-            <a:r>
-              <a:rPr lang="fr-CA" sz="3200" dirty="0" err="1">
-                <a:latin typeface="Calibri" panose="020F0502020204030204" pitchFamily="34" charset="0"/>
-              </a:rPr>
-              <a:t>grid-column</a:t>
-            </a:r>
-            <a:r>
-              <a:rPr lang="fr-CA" sz="3200" dirty="0">
-                <a:latin typeface="Calibri" panose="020F0502020204030204" pitchFamily="34" charset="0"/>
-              </a:rPr>
-              <a:t>: 1 / -1;</a:t>
-            </a:r>
-          </a:p>
-          <a:p>
-            <a:pPr marL="0" indent="0">
-              <a:buNone/>
-            </a:pPr>
-            <a:r>
-              <a:rPr lang="fr-CA" sz="3200" dirty="0">
+            <a:r>
+              <a:rPr lang="fr-CA" sz="5800" dirty="0">
                 <a:latin typeface="Calibri" panose="020F0502020204030204" pitchFamily="34" charset="0"/>
               </a:rPr>
               <a:t>}</a:t>
@@ -6511,7 +6763,7 @@
     </p:spTree>
     <p:extLst>
       <p:ext uri="{BB962C8B-B14F-4D97-AF65-F5344CB8AC3E}">
-        <p14:creationId xmlns:p14="http://schemas.microsoft.com/office/powerpoint/2010/main" val="3197163125"/>
+        <p14:creationId xmlns:p14="http://schemas.microsoft.com/office/powerpoint/2010/main" val="1335371643"/>
       </p:ext>
     </p:extLst>
   </p:cSld>
@@ -6543,6 +6795,358 @@
           <p:cNvPr id="2" name="Titre 1">
             <a:extLst>
               <a:ext uri="{FF2B5EF4-FFF2-40B4-BE49-F238E27FC236}">
+                <a16:creationId xmlns:a16="http://schemas.microsoft.com/office/drawing/2014/main" id="{6301694F-C650-4A31-83CA-3FF41BAECFFF}"/>
+              </a:ext>
+            </a:extLst>
+          </p:cNvPr>
+          <p:cNvSpPr>
+            <a:spLocks noGrp="1"/>
+          </p:cNvSpPr>
+          <p:nvPr>
+            <p:ph type="title"/>
+          </p:nvPr>
+        </p:nvSpPr>
+        <p:spPr>
+          <a:xfrm>
+            <a:off x="838200" y="365126"/>
+            <a:ext cx="10515600" cy="773562"/>
+          </a:xfrm>
+        </p:spPr>
+        <p:txBody>
+          <a:bodyPr>
+            <a:normAutofit/>
+          </a:bodyPr>
+          <a:lstStyle/>
+          <a:p>
+            <a:pPr algn="ctr"/>
+            <a:r>
+              <a:rPr lang="fr-CA" sz="4400" dirty="0" err="1">
+                <a:latin typeface="Calibri" panose="020F0502020204030204" pitchFamily="34" charset="0"/>
+              </a:rPr>
+              <a:t>Grid</a:t>
+            </a:r>
+            <a:r>
+              <a:rPr lang="fr-CA" sz="4400" dirty="0">
+                <a:latin typeface="Calibri" panose="020F0502020204030204" pitchFamily="34" charset="0"/>
+              </a:rPr>
+              <a:t> vs. Flexbox</a:t>
+            </a:r>
+          </a:p>
+        </p:txBody>
+      </p:sp>
+      <p:sp>
+        <p:nvSpPr>
+          <p:cNvPr id="3" name="Espace réservé du contenu 2">
+            <a:extLst>
+              <a:ext uri="{FF2B5EF4-FFF2-40B4-BE49-F238E27FC236}">
+                <a16:creationId xmlns:a16="http://schemas.microsoft.com/office/drawing/2014/main" id="{29AE6743-BCEE-41F1-9628-602E51B489E5}"/>
+              </a:ext>
+            </a:extLst>
+          </p:cNvPr>
+          <p:cNvSpPr>
+            <a:spLocks noGrp="1"/>
+          </p:cNvSpPr>
+          <p:nvPr>
+            <p:ph sz="half" idx="1"/>
+          </p:nvPr>
+        </p:nvSpPr>
+        <p:spPr>
+          <a:xfrm>
+            <a:off x="838200" y="1811547"/>
+            <a:ext cx="5181600" cy="4365416"/>
+          </a:xfrm>
+        </p:spPr>
+        <p:txBody>
+          <a:bodyPr>
+            <a:normAutofit lnSpcReduction="10000"/>
+          </a:bodyPr>
+          <a:lstStyle/>
+          <a:p>
+            <a:pPr marL="0" indent="0">
+              <a:buNone/>
+            </a:pPr>
+            <a:r>
+              <a:rPr lang="fr-CA" sz="3500" dirty="0">
+                <a:latin typeface="Calibri" panose="020F0502020204030204" pitchFamily="34" charset="0"/>
+              </a:rPr>
+              <a:t>.header &gt; </a:t>
+            </a:r>
+            <a:r>
+              <a:rPr lang="fr-CA" sz="3500" dirty="0" err="1">
+                <a:latin typeface="Calibri" panose="020F0502020204030204" pitchFamily="34" charset="0"/>
+              </a:rPr>
+              <a:t>div:nth-child</a:t>
+            </a:r>
+            <a:r>
+              <a:rPr lang="fr-CA" sz="3500" dirty="0">
+                <a:latin typeface="Calibri" panose="020F0502020204030204" pitchFamily="34" charset="0"/>
+              </a:rPr>
+              <a:t>(3) {</a:t>
+            </a:r>
+          </a:p>
+          <a:p>
+            <a:pPr marL="0" indent="0">
+              <a:buNone/>
+            </a:pPr>
+            <a:r>
+              <a:rPr lang="fr-CA" sz="3500" dirty="0">
+                <a:latin typeface="Calibri" panose="020F0502020204030204" pitchFamily="34" charset="0"/>
+              </a:rPr>
+              <a:t>	</a:t>
+            </a:r>
+            <a:r>
+              <a:rPr lang="fr-CA" sz="3500" dirty="0" err="1">
+                <a:latin typeface="Calibri" panose="020F0502020204030204" pitchFamily="34" charset="0"/>
+              </a:rPr>
+              <a:t>margin-left</a:t>
+            </a:r>
+            <a:r>
+              <a:rPr lang="fr-CA" sz="3500" dirty="0">
+                <a:latin typeface="Calibri" panose="020F0502020204030204" pitchFamily="34" charset="0"/>
+              </a:rPr>
+              <a:t>: auto;</a:t>
+            </a:r>
+          </a:p>
+          <a:p>
+            <a:pPr marL="0" indent="0">
+              <a:buNone/>
+            </a:pPr>
+            <a:r>
+              <a:rPr lang="fr-CA" sz="3500" dirty="0">
+                <a:latin typeface="Calibri" panose="020F0502020204030204" pitchFamily="34" charset="0"/>
+              </a:rPr>
+              <a:t>}</a:t>
+            </a:r>
+          </a:p>
+          <a:p>
+            <a:pPr marL="0" indent="0">
+              <a:buNone/>
+            </a:pPr>
+            <a:br>
+              <a:rPr lang="fr-CA" sz="3500" dirty="0">
+                <a:latin typeface="Calibri" panose="020F0502020204030204" pitchFamily="34" charset="0"/>
+              </a:rPr>
+            </a:br>
+            <a:r>
+              <a:rPr lang="fr-CA" sz="3500" dirty="0">
+                <a:latin typeface="Calibri" panose="020F0502020204030204" pitchFamily="34" charset="0"/>
+              </a:rPr>
+              <a:t>.menu {</a:t>
+            </a:r>
+          </a:p>
+          <a:p>
+            <a:pPr marL="0" indent="0">
+              <a:buNone/>
+            </a:pPr>
+            <a:r>
+              <a:rPr lang="fr-CA" sz="3500" dirty="0">
+                <a:latin typeface="Calibri" panose="020F0502020204030204" pitchFamily="34" charset="0"/>
+              </a:rPr>
+              <a:t>	</a:t>
+            </a:r>
+            <a:r>
+              <a:rPr lang="fr-CA" sz="3500" dirty="0" err="1">
+                <a:latin typeface="Calibri" panose="020F0502020204030204" pitchFamily="34" charset="0"/>
+              </a:rPr>
+              <a:t>grid-column</a:t>
+            </a:r>
+            <a:r>
+              <a:rPr lang="fr-CA" sz="3500" dirty="0">
+                <a:latin typeface="Calibri" panose="020F0502020204030204" pitchFamily="34" charset="0"/>
+              </a:rPr>
+              <a:t>: 1 / 2;</a:t>
+            </a:r>
+          </a:p>
+          <a:p>
+            <a:pPr marL="0" indent="0">
+              <a:buNone/>
+            </a:pPr>
+            <a:r>
+              <a:rPr lang="fr-CA" sz="3500" dirty="0">
+                <a:latin typeface="Calibri" panose="020F0502020204030204" pitchFamily="34" charset="0"/>
+              </a:rPr>
+              <a:t>}</a:t>
+            </a:r>
+          </a:p>
+          <a:p>
+            <a:endParaRPr lang="fr-CA" dirty="0"/>
+          </a:p>
+        </p:txBody>
+      </p:sp>
+      <p:sp>
+        <p:nvSpPr>
+          <p:cNvPr id="4" name="Espace réservé du contenu 3">
+            <a:extLst>
+              <a:ext uri="{FF2B5EF4-FFF2-40B4-BE49-F238E27FC236}">
+                <a16:creationId xmlns:a16="http://schemas.microsoft.com/office/drawing/2014/main" id="{47629136-0AA8-4981-8D69-8603C16F295C}"/>
+              </a:ext>
+            </a:extLst>
+          </p:cNvPr>
+          <p:cNvSpPr>
+            <a:spLocks noGrp="1"/>
+          </p:cNvSpPr>
+          <p:nvPr>
+            <p:ph sz="half" idx="2"/>
+          </p:nvPr>
+        </p:nvSpPr>
+        <p:spPr>
+          <a:xfrm>
+            <a:off x="7073660" y="1811547"/>
+            <a:ext cx="4520242" cy="4365416"/>
+          </a:xfrm>
+        </p:spPr>
+        <p:txBody>
+          <a:bodyPr>
+            <a:normAutofit lnSpcReduction="10000"/>
+          </a:bodyPr>
+          <a:lstStyle/>
+          <a:p>
+            <a:pPr marL="0" indent="0">
+              <a:buNone/>
+            </a:pPr>
+            <a:r>
+              <a:rPr lang="fr-CA" sz="3200" dirty="0">
+                <a:latin typeface="Calibri" panose="020F0502020204030204" pitchFamily="34" charset="0"/>
+              </a:rPr>
+              <a:t>.content {</a:t>
+            </a:r>
+          </a:p>
+          <a:p>
+            <a:pPr marL="0" indent="0">
+              <a:buNone/>
+            </a:pPr>
+            <a:r>
+              <a:rPr lang="fr-CA" sz="3200" dirty="0">
+                <a:latin typeface="Calibri" panose="020F0502020204030204" pitchFamily="34" charset="0"/>
+              </a:rPr>
+              <a:t>	</a:t>
+            </a:r>
+            <a:r>
+              <a:rPr lang="fr-CA" sz="3200" dirty="0" err="1">
+                <a:latin typeface="Calibri" panose="020F0502020204030204" pitchFamily="34" charset="0"/>
+              </a:rPr>
+              <a:t>grid-column</a:t>
+            </a:r>
+            <a:r>
+              <a:rPr lang="fr-CA" sz="3200" dirty="0">
+                <a:latin typeface="Calibri" panose="020F0502020204030204" pitchFamily="34" charset="0"/>
+              </a:rPr>
+              <a:t>: 2 / -1;</a:t>
+            </a:r>
+          </a:p>
+          <a:p>
+            <a:pPr marL="0" indent="0">
+              <a:buNone/>
+            </a:pPr>
+            <a:r>
+              <a:rPr lang="fr-CA" sz="3200" dirty="0">
+                <a:latin typeface="Calibri" panose="020F0502020204030204" pitchFamily="34" charset="0"/>
+              </a:rPr>
+              <a:t>}</a:t>
+            </a:r>
+          </a:p>
+          <a:p>
+            <a:pPr marL="0" indent="0">
+              <a:buNone/>
+            </a:pPr>
+            <a:br>
+              <a:rPr lang="fr-CA" sz="3200" dirty="0">
+                <a:latin typeface="Calibri" panose="020F0502020204030204" pitchFamily="34" charset="0"/>
+              </a:rPr>
+            </a:br>
+            <a:r>
+              <a:rPr lang="fr-CA" sz="3200" dirty="0">
+                <a:latin typeface="Calibri" panose="020F0502020204030204" pitchFamily="34" charset="0"/>
+              </a:rPr>
+              <a:t>.</a:t>
+            </a:r>
+            <a:r>
+              <a:rPr lang="fr-CA" sz="3200" dirty="0" err="1">
+                <a:latin typeface="Calibri" panose="020F0502020204030204" pitchFamily="34" charset="0"/>
+              </a:rPr>
+              <a:t>footer</a:t>
+            </a:r>
+            <a:r>
+              <a:rPr lang="fr-CA" sz="3200" dirty="0">
+                <a:latin typeface="Calibri" panose="020F0502020204030204" pitchFamily="34" charset="0"/>
+              </a:rPr>
+              <a:t> {</a:t>
+            </a:r>
+          </a:p>
+          <a:p>
+            <a:pPr marL="0" indent="0">
+              <a:buNone/>
+            </a:pPr>
+            <a:r>
+              <a:rPr lang="fr-CA" sz="3200" dirty="0">
+                <a:latin typeface="Calibri" panose="020F0502020204030204" pitchFamily="34" charset="0"/>
+              </a:rPr>
+              <a:t>	</a:t>
+            </a:r>
+            <a:r>
+              <a:rPr lang="fr-CA" sz="3200" dirty="0" err="1">
+                <a:latin typeface="Calibri" panose="020F0502020204030204" pitchFamily="34" charset="0"/>
+              </a:rPr>
+              <a:t>grid-column</a:t>
+            </a:r>
+            <a:r>
+              <a:rPr lang="fr-CA" sz="3200" dirty="0">
+                <a:latin typeface="Calibri" panose="020F0502020204030204" pitchFamily="34" charset="0"/>
+              </a:rPr>
+              <a:t>: 1 / -1;</a:t>
+            </a:r>
+          </a:p>
+          <a:p>
+            <a:pPr marL="0" indent="0">
+              <a:buNone/>
+            </a:pPr>
+            <a:r>
+              <a:rPr lang="fr-CA" sz="3200" dirty="0">
+                <a:latin typeface="Calibri" panose="020F0502020204030204" pitchFamily="34" charset="0"/>
+              </a:rPr>
+              <a:t>}</a:t>
+            </a:r>
+          </a:p>
+          <a:p>
+            <a:endParaRPr lang="fr-CA" dirty="0"/>
+          </a:p>
+        </p:txBody>
+      </p:sp>
+    </p:spTree>
+    <p:extLst>
+      <p:ext uri="{BB962C8B-B14F-4D97-AF65-F5344CB8AC3E}">
+        <p14:creationId xmlns:p14="http://schemas.microsoft.com/office/powerpoint/2010/main" val="3197163125"/>
+      </p:ext>
+    </p:extLst>
+  </p:cSld>
+  <p:clrMapOvr>
+    <a:masterClrMapping/>
+  </p:clrMapOvr>
+</p:sld>
+</file>
+
+<file path=ppt/slides/slide12.xml><?xml version="1.0" encoding="utf-8"?>
+<p:sld xmlns:a="http://schemas.openxmlformats.org/drawingml/2006/main" xmlns:r="http://schemas.openxmlformats.org/officeDocument/2006/relationships" xmlns:p="http://schemas.openxmlformats.org/presentationml/2006/main">
+  <p:cSld>
+    <p:spTree>
+      <p:nvGrpSpPr>
+        <p:cNvPr id="1" name=""/>
+        <p:cNvGrpSpPr/>
+        <p:nvPr/>
+      </p:nvGrpSpPr>
+      <p:grpSpPr>
+        <a:xfrm>
+          <a:off x="0" y="0"/>
+          <a:ext cx="0" cy="0"/>
+          <a:chOff x="0" y="0"/>
+          <a:chExt cx="0" cy="0"/>
+        </a:xfrm>
+      </p:grpSpPr>
+      <p:sp>
+        <p:nvSpPr>
+          <p:cNvPr id="2" name="Titre 1">
+            <a:extLst>
+              <a:ext uri="{FF2B5EF4-FFF2-40B4-BE49-F238E27FC236}">
                 <a16:creationId xmlns:a16="http://schemas.microsoft.com/office/drawing/2014/main" id="{1744068F-E87C-427C-8455-5F4E6124EF7F}"/>
               </a:ext>
             </a:extLst>
@@ -6606,7 +7210,7 @@
         </p:spPr>
         <p:txBody>
           <a:bodyPr>
-            <a:normAutofit fontScale="77500" lnSpcReduction="20000"/>
+            <a:normAutofit fontScale="70000" lnSpcReduction="20000"/>
           </a:bodyPr>
           <a:lstStyle/>
           <a:p>
@@ -6614,15 +7218,21 @@
               <a:buNone/>
             </a:pPr>
             <a:r>
-              <a:rPr lang="fr-CA" sz="3600" dirty="0"/>
+              <a:rPr lang="fr-CA" sz="4600" dirty="0">
+                <a:latin typeface="Calibri" panose="020F0502020204030204" pitchFamily="34" charset="0"/>
+              </a:rPr>
               <a:t>.</a:t>
             </a:r>
             <a:r>
-              <a:rPr lang="fr-CA" sz="3600" dirty="0" err="1"/>
+              <a:rPr lang="fr-CA" sz="4600" dirty="0" err="1">
+                <a:latin typeface="Calibri" panose="020F0502020204030204" pitchFamily="34" charset="0"/>
+              </a:rPr>
               <a:t>flexbox</a:t>
             </a:r>
             <a:r>
-              <a:rPr lang="fr-CA" sz="3600" dirty="0"/>
+              <a:rPr lang="fr-CA" sz="4600" dirty="0">
+                <a:latin typeface="Calibri" panose="020F0502020204030204" pitchFamily="34" charset="0"/>
+              </a:rPr>
               <a:t>-header {</a:t>
             </a:r>
           </a:p>
@@ -6631,19 +7241,24 @@
               <a:buNone/>
             </a:pPr>
             <a:r>
-              <a:rPr lang="fr-CA" sz="3600" dirty="0"/>
+              <a:rPr lang="fr-CA" sz="4600" dirty="0">
+                <a:latin typeface="Calibri" panose="020F0502020204030204" pitchFamily="34" charset="0"/>
+              </a:rPr>
               <a:t>	display: </a:t>
             </a:r>
             <a:r>
-              <a:rPr lang="fr-CA" sz="3600" dirty="0" err="1">
-                <a:solidFill>
-                  <a:srgbClr val="00B0F0"/>
-                </a:solidFill>
+              <a:rPr lang="fr-CA" sz="4600" dirty="0" err="1">
+                <a:solidFill>
+                  <a:srgbClr val="00B0F0"/>
+                </a:solidFill>
+                <a:latin typeface="Calibri" panose="020F0502020204030204" pitchFamily="34" charset="0"/>
               </a:rPr>
               <a:t>flex</a:t>
             </a:r>
             <a:r>
-              <a:rPr lang="fr-CA" sz="3600" dirty="0"/>
+              <a:rPr lang="fr-CA" sz="4600" dirty="0">
+                <a:latin typeface="Calibri" panose="020F0502020204030204" pitchFamily="34" charset="0"/>
+              </a:rPr>
               <a:t>;</a:t>
             </a:r>
           </a:p>
@@ -6652,7 +7267,9 @@
               <a:buNone/>
             </a:pPr>
             <a:r>
-              <a:rPr lang="fr-CA" sz="3600" dirty="0"/>
+              <a:rPr lang="fr-CA" sz="4600" dirty="0">
+                <a:latin typeface="Calibri" panose="020F0502020204030204" pitchFamily="34" charset="0"/>
+              </a:rPr>
               <a:t>}</a:t>
             </a:r>
           </a:p>
@@ -6661,26 +7278,38 @@
               <a:buNone/>
             </a:pPr>
             <a:br>
-              <a:rPr lang="fr-CA" sz="3600" dirty="0"/>
+              <a:rPr lang="fr-CA" sz="4600" dirty="0">
+                <a:latin typeface="Calibri" panose="020F0502020204030204" pitchFamily="34" charset="0"/>
+              </a:rPr>
             </a:br>
             <a:r>
-              <a:rPr lang="fr-CA" sz="3600" dirty="0"/>
+              <a:rPr lang="fr-CA" sz="4600" dirty="0">
+                <a:latin typeface="Calibri" panose="020F0502020204030204" pitchFamily="34" charset="0"/>
+              </a:rPr>
               <a:t>.</a:t>
             </a:r>
             <a:r>
-              <a:rPr lang="fr-CA" sz="3600" dirty="0" err="1"/>
+              <a:rPr lang="fr-CA" sz="4600" dirty="0" err="1">
+                <a:latin typeface="Calibri" panose="020F0502020204030204" pitchFamily="34" charset="0"/>
+              </a:rPr>
               <a:t>flexbox</a:t>
             </a:r>
             <a:r>
-              <a:rPr lang="fr-CA" sz="3600" dirty="0"/>
+              <a:rPr lang="fr-CA" sz="4600" dirty="0">
+                <a:latin typeface="Calibri" panose="020F0502020204030204" pitchFamily="34" charset="0"/>
+              </a:rPr>
               <a:t>-header &gt; </a:t>
             </a:r>
             <a:r>
-              <a:rPr lang="fr-CA" sz="3600" dirty="0" err="1"/>
+              <a:rPr lang="fr-CA" sz="4600" dirty="0" err="1">
+                <a:latin typeface="Calibri" panose="020F0502020204030204" pitchFamily="34" charset="0"/>
+              </a:rPr>
               <a:t>div:nth-child</a:t>
             </a:r>
             <a:r>
-              <a:rPr lang="fr-CA" sz="3600" dirty="0"/>
+              <a:rPr lang="fr-CA" sz="4600" dirty="0">
+                <a:latin typeface="Calibri" panose="020F0502020204030204" pitchFamily="34" charset="0"/>
+              </a:rPr>
               <a:t>(3) {</a:t>
             </a:r>
           </a:p>
@@ -6689,15 +7318,21 @@
               <a:buNone/>
             </a:pPr>
             <a:r>
-              <a:rPr lang="fr-CA" sz="3600" dirty="0"/>
+              <a:rPr lang="fr-CA" sz="4600" dirty="0">
+                <a:latin typeface="Calibri" panose="020F0502020204030204" pitchFamily="34" charset="0"/>
+              </a:rPr>
               <a:t>	</a:t>
             </a:r>
             <a:r>
-              <a:rPr lang="fr-CA" sz="3600" dirty="0" err="1"/>
+              <a:rPr lang="fr-CA" sz="4600" dirty="0" err="1">
+                <a:latin typeface="Calibri" panose="020F0502020204030204" pitchFamily="34" charset="0"/>
+              </a:rPr>
               <a:t>margin-left</a:t>
             </a:r>
             <a:r>
-              <a:rPr lang="fr-CA" sz="3600" dirty="0"/>
+              <a:rPr lang="fr-CA" sz="4600" dirty="0">
+                <a:latin typeface="Calibri" panose="020F0502020204030204" pitchFamily="34" charset="0"/>
+              </a:rPr>
               <a:t>: auto;</a:t>
             </a:r>
           </a:p>
@@ -6706,7 +7341,9 @@
               <a:buNone/>
             </a:pPr>
             <a:r>
-              <a:rPr lang="fr-CA" sz="3600" dirty="0"/>
+              <a:rPr lang="fr-CA" sz="4600" dirty="0">
+                <a:latin typeface="Calibri" panose="020F0502020204030204" pitchFamily="34" charset="0"/>
+              </a:rPr>
               <a:t>}</a:t>
             </a:r>
           </a:p>
@@ -6739,7 +7376,7 @@
         </p:spPr>
         <p:txBody>
           <a:bodyPr>
-            <a:normAutofit fontScale="77500" lnSpcReduction="20000"/>
+            <a:normAutofit fontScale="70000" lnSpcReduction="20000"/>
           </a:bodyPr>
           <a:lstStyle/>
           <a:p>
@@ -6747,15 +7384,21 @@
               <a:buNone/>
             </a:pPr>
             <a:r>
-              <a:rPr lang="fr-CA" sz="3600" dirty="0"/>
+              <a:rPr lang="fr-CA" sz="4100" dirty="0">
+                <a:latin typeface="Calibri" panose="020F0502020204030204" pitchFamily="34" charset="0"/>
+              </a:rPr>
               <a:t>.</a:t>
             </a:r>
             <a:r>
-              <a:rPr lang="fr-CA" sz="3600" dirty="0" err="1"/>
+              <a:rPr lang="fr-CA" sz="4100" dirty="0" err="1">
+                <a:latin typeface="Calibri" panose="020F0502020204030204" pitchFamily="34" charset="0"/>
+              </a:rPr>
               <a:t>grid</a:t>
             </a:r>
             <a:r>
-              <a:rPr lang="fr-CA" sz="3600" dirty="0"/>
+              <a:rPr lang="fr-CA" sz="4100" dirty="0">
+                <a:latin typeface="Calibri" panose="020F0502020204030204" pitchFamily="34" charset="0"/>
+              </a:rPr>
               <a:t>-page {</a:t>
             </a:r>
           </a:p>
@@ -6764,19 +7407,24 @@
               <a:buNone/>
             </a:pPr>
             <a:r>
-              <a:rPr lang="fr-CA" sz="3600" dirty="0"/>
+              <a:rPr lang="fr-CA" sz="4100" dirty="0">
+                <a:latin typeface="Calibri" panose="020F0502020204030204" pitchFamily="34" charset="0"/>
+              </a:rPr>
               <a:t>	display: </a:t>
             </a:r>
             <a:r>
-              <a:rPr lang="fr-CA" sz="3600" dirty="0" err="1">
-                <a:solidFill>
-                  <a:srgbClr val="00B0F0"/>
-                </a:solidFill>
+              <a:rPr lang="fr-CA" sz="4100" dirty="0" err="1">
+                <a:solidFill>
+                  <a:srgbClr val="00B0F0"/>
+                </a:solidFill>
+                <a:latin typeface="Calibri" panose="020F0502020204030204" pitchFamily="34" charset="0"/>
               </a:rPr>
               <a:t>grid</a:t>
             </a:r>
             <a:r>
-              <a:rPr lang="fr-CA" sz="3600" dirty="0"/>
+              <a:rPr lang="fr-CA" sz="4100" dirty="0">
+                <a:latin typeface="Calibri" panose="020F0502020204030204" pitchFamily="34" charset="0"/>
+              </a:rPr>
               <a:t>;</a:t>
             </a:r>
           </a:p>
@@ -6785,23 +7433,33 @@
               <a:buNone/>
             </a:pPr>
             <a:r>
-              <a:rPr lang="fr-CA" sz="3600" dirty="0"/>
+              <a:rPr lang="fr-CA" sz="4100" dirty="0">
+                <a:latin typeface="Calibri" panose="020F0502020204030204" pitchFamily="34" charset="0"/>
+              </a:rPr>
               <a:t>	</a:t>
             </a:r>
             <a:r>
-              <a:rPr lang="fr-CA" sz="3600" dirty="0" err="1"/>
+              <a:rPr lang="fr-CA" sz="4100" dirty="0" err="1">
+                <a:latin typeface="Calibri" panose="020F0502020204030204" pitchFamily="34" charset="0"/>
+              </a:rPr>
               <a:t>grid-template-columns</a:t>
             </a:r>
             <a:r>
-              <a:rPr lang="fr-CA" sz="3600" dirty="0"/>
+              <a:rPr lang="fr-CA" sz="4100" dirty="0">
+                <a:latin typeface="Calibri" panose="020F0502020204030204" pitchFamily="34" charset="0"/>
+              </a:rPr>
               <a:t>: 	</a:t>
             </a:r>
             <a:r>
-              <a:rPr lang="fr-CA" sz="3600" dirty="0" err="1"/>
+              <a:rPr lang="fr-CA" sz="4100" dirty="0" err="1">
+                <a:latin typeface="Calibri" panose="020F0502020204030204" pitchFamily="34" charset="0"/>
+              </a:rPr>
               <a:t>repeat</a:t>
             </a:r>
             <a:r>
-              <a:rPr lang="fr-CA" sz="3600" dirty="0"/>
+              <a:rPr lang="fr-CA" sz="4100" dirty="0">
+                <a:latin typeface="Calibri" panose="020F0502020204030204" pitchFamily="34" charset="0"/>
+              </a:rPr>
               <a:t>(12, 1fr);</a:t>
             </a:r>
           </a:p>
@@ -6810,15 +7468,21 @@
               <a:buNone/>
             </a:pPr>
             <a:r>
-              <a:rPr lang="fr-CA" sz="3600" dirty="0"/>
+              <a:rPr lang="fr-CA" sz="4100" dirty="0">
+                <a:latin typeface="Calibri" panose="020F0502020204030204" pitchFamily="34" charset="0"/>
+              </a:rPr>
               <a:t>	</a:t>
             </a:r>
             <a:r>
-              <a:rPr lang="fr-CA" sz="3600" dirty="0" err="1"/>
+              <a:rPr lang="fr-CA" sz="4100" dirty="0" err="1">
+                <a:latin typeface="Calibri" panose="020F0502020204030204" pitchFamily="34" charset="0"/>
+              </a:rPr>
               <a:t>grid-template-rows</a:t>
             </a:r>
             <a:r>
-              <a:rPr lang="fr-CA" sz="3600" dirty="0"/>
+              <a:rPr lang="fr-CA" sz="4100" dirty="0">
+                <a:latin typeface="Calibri" panose="020F0502020204030204" pitchFamily="34" charset="0"/>
+              </a:rPr>
               <a:t>: 40px 	200px 40px;</a:t>
             </a:r>
           </a:p>
@@ -6827,7 +7491,9 @@
               <a:buNone/>
             </a:pPr>
             <a:r>
-              <a:rPr lang="fr-CA" sz="3600" dirty="0"/>
+              <a:rPr lang="fr-CA" sz="4100" dirty="0">
+                <a:latin typeface="Calibri" panose="020F0502020204030204" pitchFamily="34" charset="0"/>
+              </a:rPr>
               <a:t>}</a:t>
             </a:r>
           </a:p>
@@ -6836,10 +7502,14 @@
               <a:buNone/>
             </a:pPr>
             <a:br>
-              <a:rPr lang="fr-CA" sz="3600" dirty="0"/>
+              <a:rPr lang="fr-CA" sz="4100" dirty="0">
+                <a:latin typeface="Calibri" panose="020F0502020204030204" pitchFamily="34" charset="0"/>
+              </a:rPr>
             </a:br>
             <a:r>
-              <a:rPr lang="fr-CA" sz="3600" dirty="0"/>
+              <a:rPr lang="fr-CA" sz="4100" dirty="0">
+                <a:latin typeface="Calibri" panose="020F0502020204030204" pitchFamily="34" charset="0"/>
+              </a:rPr>
               <a:t>.header {</a:t>
             </a:r>
           </a:p>
@@ -6848,15 +7518,21 @@
               <a:buNone/>
             </a:pPr>
             <a:r>
-              <a:rPr lang="fr-CA" sz="3600" dirty="0"/>
+              <a:rPr lang="fr-CA" sz="4100" dirty="0">
+                <a:latin typeface="Calibri" panose="020F0502020204030204" pitchFamily="34" charset="0"/>
+              </a:rPr>
               <a:t>	</a:t>
             </a:r>
             <a:r>
-              <a:rPr lang="fr-CA" sz="3600" dirty="0" err="1"/>
+              <a:rPr lang="fr-CA" sz="4100" dirty="0" err="1">
+                <a:latin typeface="Calibri" panose="020F0502020204030204" pitchFamily="34" charset="0"/>
+              </a:rPr>
               <a:t>grid-column</a:t>
             </a:r>
             <a:r>
-              <a:rPr lang="fr-CA" sz="3600" dirty="0"/>
+              <a:rPr lang="fr-CA" sz="4100" dirty="0">
+                <a:latin typeface="Calibri" panose="020F0502020204030204" pitchFamily="34" charset="0"/>
+              </a:rPr>
               <a:t>: 1 / -1;</a:t>
             </a:r>
           </a:p>
@@ -6865,15 +7541,21 @@
               <a:buNone/>
             </a:pPr>
             <a:r>
-              <a:rPr lang="fr-CA" sz="3600" dirty="0"/>
+              <a:rPr lang="fr-CA" sz="4100" dirty="0">
+                <a:latin typeface="Calibri" panose="020F0502020204030204" pitchFamily="34" charset="0"/>
+              </a:rPr>
               <a:t>	display: </a:t>
             </a:r>
             <a:r>
-              <a:rPr lang="fr-CA" sz="3600" dirty="0" err="1"/>
+              <a:rPr lang="fr-CA" sz="4100" dirty="0" err="1">
+                <a:latin typeface="Calibri" panose="020F0502020204030204" pitchFamily="34" charset="0"/>
+              </a:rPr>
               <a:t>flex</a:t>
             </a:r>
             <a:r>
-              <a:rPr lang="fr-CA" sz="3600" dirty="0"/>
+              <a:rPr lang="fr-CA" sz="4100" dirty="0">
+                <a:latin typeface="Calibri" panose="020F0502020204030204" pitchFamily="34" charset="0"/>
+              </a:rPr>
               <a:t>;</a:t>
             </a:r>
           </a:p>
@@ -6882,7 +7564,9 @@
               <a:buNone/>
             </a:pPr>
             <a:r>
-              <a:rPr lang="fr-CA" sz="3600" dirty="0"/>
+              <a:rPr lang="fr-CA" sz="4100" dirty="0">
+                <a:latin typeface="Calibri" panose="020F0502020204030204" pitchFamily="34" charset="0"/>
+              </a:rPr>
               <a:t>}</a:t>
             </a:r>
           </a:p>
@@ -6895,6 +7579,71 @@
     <p:extLst>
       <p:ext uri="{BB962C8B-B14F-4D97-AF65-F5344CB8AC3E}">
         <p14:creationId xmlns:p14="http://schemas.microsoft.com/office/powerpoint/2010/main" val="1361701914"/>
+      </p:ext>
+    </p:extLst>
+  </p:cSld>
+  <p:clrMapOvr>
+    <a:masterClrMapping/>
+  </p:clrMapOvr>
+</p:sld>
+</file>
+
+<file path=ppt/slides/slide13.xml><?xml version="1.0" encoding="utf-8"?>
+<p:sld xmlns:a="http://schemas.openxmlformats.org/drawingml/2006/main" xmlns:r="http://schemas.openxmlformats.org/officeDocument/2006/relationships" xmlns:p="http://schemas.openxmlformats.org/presentationml/2006/main">
+  <p:cSld>
+    <p:spTree>
+      <p:nvGrpSpPr>
+        <p:cNvPr id="1" name=""/>
+        <p:cNvGrpSpPr/>
+        <p:nvPr/>
+      </p:nvGrpSpPr>
+      <p:grpSpPr>
+        <a:xfrm>
+          <a:off x="0" y="0"/>
+          <a:ext cx="0" cy="0"/>
+          <a:chOff x="0" y="0"/>
+          <a:chExt cx="0" cy="0"/>
+        </a:xfrm>
+      </p:grpSpPr>
+      <p:sp>
+        <p:nvSpPr>
+          <p:cNvPr id="2" name="Titre 1">
+            <a:extLst>
+              <a:ext uri="{FF2B5EF4-FFF2-40B4-BE49-F238E27FC236}">
+                <a16:creationId xmlns:a16="http://schemas.microsoft.com/office/drawing/2014/main" id="{105A3319-33C5-49E4-BDFD-26B5E40CF897}"/>
+              </a:ext>
+            </a:extLst>
+          </p:cNvPr>
+          <p:cNvSpPr>
+            <a:spLocks noGrp="1"/>
+          </p:cNvSpPr>
+          <p:nvPr>
+            <p:ph type="title"/>
+          </p:nvPr>
+        </p:nvSpPr>
+        <p:spPr>
+          <a:xfrm>
+            <a:off x="691831" y="2433918"/>
+            <a:ext cx="9404723" cy="1400530"/>
+          </a:xfrm>
+        </p:spPr>
+        <p:txBody>
+          <a:bodyPr/>
+          <a:lstStyle/>
+          <a:p>
+            <a:r>
+              <a:rPr lang="fr-CA" sz="7200" dirty="0">
+                <a:latin typeface="Calibri" panose="020F0502020204030204" pitchFamily="34" charset="0"/>
+              </a:rPr>
+              <a:t>END</a:t>
+            </a:r>
+          </a:p>
+        </p:txBody>
+      </p:sp>
+    </p:spTree>
+    <p:extLst>
+      <p:ext uri="{BB962C8B-B14F-4D97-AF65-F5344CB8AC3E}">
+        <p14:creationId xmlns:p14="http://schemas.microsoft.com/office/powerpoint/2010/main" val="3891629103"/>
       </p:ext>
     </p:extLst>
   </p:cSld>
@@ -6939,7 +7688,7 @@
         </p:nvSpPr>
         <p:spPr>
           <a:xfrm>
-            <a:off x="838200" y="365126"/>
+            <a:off x="609600" y="175344"/>
             <a:ext cx="10515600" cy="1032354"/>
           </a:xfrm>
         </p:spPr>
@@ -7059,7 +7808,7 @@
               <a:rPr lang="fr-CA" sz="3200" dirty="0">
                 <a:latin typeface="Calibri" panose="020F0502020204030204" pitchFamily="34" charset="0"/>
               </a:rPr>
-              <a:t>: 100px auto;</a:t>
+              <a:t>: 100px auto 100px;</a:t>
             </a:r>
           </a:p>
           <a:p>
@@ -7221,30 +7970,51 @@
             <a:pPr algn="ctr"/>
             <a:r>
               <a:rPr lang="fr-CA" sz="4400" dirty="0">
+                <a:solidFill>
+                  <a:srgbClr val="00B0F0"/>
+                </a:solidFill>
                 <a:latin typeface="Calibri" panose="020F0502020204030204" pitchFamily="34" charset="0"/>
               </a:rPr>
               <a:t>Fraction </a:t>
             </a:r>
             <a:r>
               <a:rPr lang="fr-CA" sz="4400" dirty="0" err="1">
+                <a:solidFill>
+                  <a:srgbClr val="00B0F0"/>
+                </a:solidFill>
                 <a:latin typeface="Calibri" panose="020F0502020204030204" pitchFamily="34" charset="0"/>
               </a:rPr>
               <a:t>units</a:t>
             </a:r>
             <a:r>
               <a:rPr lang="fr-CA" sz="4400" dirty="0">
-                <a:latin typeface="Calibri" panose="020F0502020204030204" pitchFamily="34" charset="0"/>
-              </a:rPr>
-              <a:t> and </a:t>
+                <a:solidFill>
+                  <a:srgbClr val="00B0F0"/>
+                </a:solidFill>
+                <a:latin typeface="Calibri" panose="020F0502020204030204" pitchFamily="34" charset="0"/>
+              </a:rPr>
+              <a:t> </a:t>
+            </a:r>
+            <a:r>
+              <a:rPr lang="fr-CA" sz="4400" dirty="0">
+                <a:latin typeface="Calibri" panose="020F0502020204030204" pitchFamily="34" charset="0"/>
+              </a:rPr>
+              <a:t>and </a:t>
             </a:r>
             <a:r>
               <a:rPr lang="fr-CA" sz="4400" dirty="0" err="1">
+                <a:solidFill>
+                  <a:srgbClr val="00B0F0"/>
+                </a:solidFill>
                 <a:latin typeface="Calibri" panose="020F0502020204030204" pitchFamily="34" charset="0"/>
               </a:rPr>
               <a:t>repeat</a:t>
             </a:r>
             <a:r>
               <a:rPr lang="fr-CA" sz="4400" dirty="0">
+                <a:solidFill>
+                  <a:srgbClr val="00B0F0"/>
+                </a:solidFill>
                 <a:latin typeface="Calibri" panose="020F0502020204030204" pitchFamily="34" charset="0"/>
               </a:rPr>
               <a:t> </a:t>
@@ -7604,9 +8374,18 @@
             <a:pPr algn="ctr"/>
             <a:r>
               <a:rPr lang="fr-CA" sz="4400" dirty="0">
-                <a:latin typeface="+mn-lt"/>
-              </a:rPr>
-              <a:t>Positioning items </a:t>
+                <a:solidFill>
+                  <a:srgbClr val="00B0F0"/>
+                </a:solidFill>
+                <a:latin typeface="Calibri" panose="020F0502020204030204" pitchFamily="34" charset="0"/>
+              </a:rPr>
+              <a:t>Positioning</a:t>
+            </a:r>
+            <a:r>
+              <a:rPr lang="fr-CA" sz="4400" dirty="0">
+                <a:latin typeface="Calibri" panose="020F0502020204030204" pitchFamily="34" charset="0"/>
+              </a:rPr>
+              <a:t> items </a:t>
             </a:r>
           </a:p>
         </p:txBody>
@@ -7886,7 +8665,7 @@
         </p:spPr>
         <p:txBody>
           <a:bodyPr>
-            <a:normAutofit fontScale="92500" lnSpcReduction="20000"/>
+            <a:normAutofit fontScale="92500" lnSpcReduction="10000"/>
           </a:bodyPr>
           <a:lstStyle/>
           <a:p>
@@ -7894,39 +8673,45 @@
               <a:buNone/>
             </a:pPr>
             <a:r>
-              <a:rPr lang="fr-CA" sz="3900" dirty="0" err="1">
-                <a:solidFill>
-                  <a:srgbClr val="00B0F0"/>
-                </a:solidFill>
+              <a:rPr lang="fr-CA" sz="3500" dirty="0" err="1">
+                <a:solidFill>
+                  <a:srgbClr val="00B0F0"/>
+                </a:solidFill>
+                <a:latin typeface="Calibri" panose="020F0502020204030204" pitchFamily="34" charset="0"/>
               </a:rPr>
               <a:t>grid</a:t>
             </a:r>
             <a:r>
-              <a:rPr lang="fr-CA" sz="3900" dirty="0">
-                <a:solidFill>
-                  <a:srgbClr val="00B0F0"/>
-                </a:solidFill>
+              <a:rPr lang="fr-CA" sz="3500" dirty="0">
+                <a:solidFill>
+                  <a:srgbClr val="00B0F0"/>
+                </a:solidFill>
+                <a:latin typeface="Calibri" panose="020F0502020204030204" pitchFamily="34" charset="0"/>
               </a:rPr>
               <a:t>-</a:t>
             </a:r>
             <a:r>
-              <a:rPr lang="fr-CA" sz="3900" dirty="0" err="1">
-                <a:solidFill>
-                  <a:srgbClr val="00B0F0"/>
-                </a:solidFill>
+              <a:rPr lang="fr-CA" sz="3500" dirty="0" err="1">
+                <a:solidFill>
+                  <a:srgbClr val="00B0F0"/>
+                </a:solidFill>
+                <a:latin typeface="Calibri" panose="020F0502020204030204" pitchFamily="34" charset="0"/>
               </a:rPr>
               <a:t>column</a:t>
             </a:r>
             <a:r>
-              <a:rPr lang="fr-CA" sz="3900" dirty="0">
-                <a:solidFill>
-                  <a:srgbClr val="00B0F0"/>
-                </a:solidFill>
+              <a:rPr lang="fr-CA" sz="3500" dirty="0">
+                <a:solidFill>
+                  <a:srgbClr val="00B0F0"/>
+                </a:solidFill>
+                <a:latin typeface="Calibri" panose="020F0502020204030204" pitchFamily="34" charset="0"/>
               </a:rPr>
               <a:t>-end</a:t>
             </a:r>
             <a:r>
-              <a:rPr lang="fr-CA" sz="3900" dirty="0"/>
+              <a:rPr lang="fr-CA" sz="3500" dirty="0">
+                <a:latin typeface="Calibri" panose="020F0502020204030204" pitchFamily="34" charset="0"/>
+              </a:rPr>
               <a:t>: 3; }</a:t>
             </a:r>
           </a:p>
@@ -7935,10 +8720,14 @@
               <a:buNone/>
             </a:pPr>
             <a:br>
-              <a:rPr lang="fr-CA" sz="3900" dirty="0"/>
+              <a:rPr lang="fr-CA" sz="3500" dirty="0">
+                <a:latin typeface="Calibri" panose="020F0502020204030204" pitchFamily="34" charset="0"/>
+              </a:rPr>
             </a:br>
             <a:r>
-              <a:rPr lang="fr-CA" sz="3900" dirty="0"/>
+              <a:rPr lang="fr-CA" sz="3500" dirty="0">
+                <a:latin typeface="Calibri" panose="020F0502020204030204" pitchFamily="34" charset="0"/>
+              </a:rPr>
               <a:t>menu {</a:t>
             </a:r>
           </a:p>
@@ -7947,15 +8736,18 @@
               <a:buNone/>
             </a:pPr>
             <a:r>
-              <a:rPr lang="fr-CA" sz="3900" dirty="0" err="1">
-                <a:solidFill>
-                  <a:srgbClr val="00B0F0"/>
-                </a:solidFill>
+              <a:rPr lang="fr-CA" sz="3500" dirty="0" err="1">
+                <a:solidFill>
+                  <a:srgbClr val="00B0F0"/>
+                </a:solidFill>
+                <a:latin typeface="Calibri" panose="020F0502020204030204" pitchFamily="34" charset="0"/>
               </a:rPr>
               <a:t>grid-row</a:t>
             </a:r>
             <a:r>
-              <a:rPr lang="fr-CA" sz="3900" dirty="0"/>
+              <a:rPr lang="fr-CA" sz="3500" dirty="0">
+                <a:latin typeface="Calibri" panose="020F0502020204030204" pitchFamily="34" charset="0"/>
+              </a:rPr>
               <a:t>: 1 / 3; }</a:t>
             </a:r>
           </a:p>
@@ -7964,10 +8756,14 @@
               <a:buNone/>
             </a:pPr>
             <a:br>
-              <a:rPr lang="fr-CA" sz="3900" dirty="0"/>
+              <a:rPr lang="fr-CA" sz="3500" dirty="0">
+                <a:latin typeface="Calibri" panose="020F0502020204030204" pitchFamily="34" charset="0"/>
+              </a:rPr>
             </a:br>
             <a:r>
-              <a:rPr lang="fr-CA" sz="3900" dirty="0"/>
+              <a:rPr lang="fr-CA" sz="3500" dirty="0">
+                <a:latin typeface="Calibri" panose="020F0502020204030204" pitchFamily="34" charset="0"/>
+              </a:rPr>
               <a:t>.content {</a:t>
             </a:r>
           </a:p>
@@ -7976,15 +8772,18 @@
               <a:buNone/>
             </a:pPr>
             <a:r>
-              <a:rPr lang="fr-CA" sz="3900" dirty="0" err="1">
-                <a:solidFill>
-                  <a:srgbClr val="00B0F0"/>
-                </a:solidFill>
+              <a:rPr lang="fr-CA" sz="3500" dirty="0" err="1">
+                <a:solidFill>
+                  <a:srgbClr val="00B0F0"/>
+                </a:solidFill>
+                <a:latin typeface="Calibri" panose="020F0502020204030204" pitchFamily="34" charset="0"/>
               </a:rPr>
               <a:t>grid-column</a:t>
             </a:r>
             <a:r>
-              <a:rPr lang="fr-CA" sz="3900" dirty="0"/>
+              <a:rPr lang="fr-CA" sz="3500" dirty="0">
+                <a:latin typeface="Calibri" panose="020F0502020204030204" pitchFamily="34" charset="0"/>
+              </a:rPr>
               <a:t>: 2 / -1; }</a:t>
             </a:r>
           </a:p>
@@ -7993,18 +8792,26 @@
               <a:buNone/>
             </a:pPr>
             <a:br>
-              <a:rPr lang="fr-CA" sz="3900" dirty="0"/>
+              <a:rPr lang="fr-CA" sz="3500" dirty="0">
+                <a:latin typeface="Calibri" panose="020F0502020204030204" pitchFamily="34" charset="0"/>
+              </a:rPr>
             </a:br>
             <a:r>
-              <a:rPr lang="fr-CA" sz="3900" dirty="0"/>
+              <a:rPr lang="fr-CA" sz="3500" dirty="0">
+                <a:latin typeface="Calibri" panose="020F0502020204030204" pitchFamily="34" charset="0"/>
+              </a:rPr>
               <a:t>.</a:t>
             </a:r>
             <a:r>
-              <a:rPr lang="fr-CA" sz="3900" dirty="0" err="1"/>
+              <a:rPr lang="fr-CA" sz="3500" dirty="0" err="1">
+                <a:latin typeface="Calibri" panose="020F0502020204030204" pitchFamily="34" charset="0"/>
+              </a:rPr>
               <a:t>footer</a:t>
             </a:r>
             <a:r>
-              <a:rPr lang="fr-CA" sz="3900" dirty="0"/>
+              <a:rPr lang="fr-CA" sz="3500" dirty="0">
+                <a:latin typeface="Calibri" panose="020F0502020204030204" pitchFamily="34" charset="0"/>
+              </a:rPr>
               <a:t> {</a:t>
             </a:r>
           </a:p>
@@ -8013,15 +8820,18 @@
               <a:buNone/>
             </a:pPr>
             <a:r>
-              <a:rPr lang="fr-CA" sz="3900" dirty="0" err="1">
-                <a:solidFill>
-                  <a:srgbClr val="00B0F0"/>
-                </a:solidFill>
+              <a:rPr lang="fr-CA" sz="3500" dirty="0" err="1">
+                <a:solidFill>
+                  <a:srgbClr val="00B0F0"/>
+                </a:solidFill>
+                <a:latin typeface="Calibri" panose="020F0502020204030204" pitchFamily="34" charset="0"/>
               </a:rPr>
               <a:t>grid-column</a:t>
             </a:r>
             <a:r>
-              <a:rPr lang="fr-CA" sz="3900" dirty="0"/>
+              <a:rPr lang="fr-CA" sz="3500" dirty="0">
+                <a:latin typeface="Calibri" panose="020F0502020204030204" pitchFamily="34" charset="0"/>
+              </a:rPr>
               <a:t>: 1 / -1; }</a:t>
             </a:r>
           </a:p>
@@ -8812,8 +9622,16 @@
               <a:buNone/>
             </a:pPr>
             <a:r>
-              <a:rPr lang="fr-CA" sz="4200" dirty="0"/>
-              <a:t>.header {</a:t>
+              <a:rPr lang="fr-CA" sz="4200" dirty="0">
+                <a:latin typeface="Calibri" panose="020F0502020204030204" pitchFamily="34" charset="0"/>
+              </a:rPr>
+              <a:t>.</a:t>
+            </a:r>
+            <a:r>
+              <a:rPr lang="fr-CA" sz="4600" dirty="0">
+                <a:latin typeface="Calibri" panose="020F0502020204030204" pitchFamily="34" charset="0"/>
+              </a:rPr>
+              <a:t>header {</a:t>
             </a:r>
           </a:p>
           <a:p>
@@ -8821,31 +9639,36 @@
               <a:buNone/>
             </a:pPr>
             <a:r>
-              <a:rPr lang="fr-CA" sz="4200" dirty="0">
-                <a:solidFill>
-                  <a:srgbClr val="00B0F0"/>
-                </a:solidFill>
+              <a:rPr lang="fr-CA" sz="4600" dirty="0">
+                <a:solidFill>
+                  <a:srgbClr val="00B0F0"/>
+                </a:solidFill>
+                <a:latin typeface="Calibri" panose="020F0502020204030204" pitchFamily="34" charset="0"/>
               </a:rPr>
               <a:t>	</a:t>
             </a:r>
             <a:r>
-              <a:rPr lang="fr-CA" sz="4200" dirty="0" err="1">
-                <a:solidFill>
-                  <a:srgbClr val="00B0F0"/>
-                </a:solidFill>
+              <a:rPr lang="fr-CA" sz="4600" dirty="0" err="1">
+                <a:solidFill>
+                  <a:srgbClr val="00B0F0"/>
+                </a:solidFill>
+                <a:latin typeface="Calibri" panose="020F0502020204030204" pitchFamily="34" charset="0"/>
               </a:rPr>
               <a:t>grid</a:t>
             </a:r>
             <a:r>
-              <a:rPr lang="fr-CA" sz="4200" dirty="0">
-                <a:solidFill>
-                  <a:srgbClr val="00B0F0"/>
-                </a:solidFill>
+              <a:rPr lang="fr-CA" sz="4600" dirty="0">
+                <a:solidFill>
+                  <a:srgbClr val="00B0F0"/>
+                </a:solidFill>
+                <a:latin typeface="Calibri" panose="020F0502020204030204" pitchFamily="34" charset="0"/>
               </a:rPr>
               <a:t>-area</a:t>
             </a:r>
             <a:r>
-              <a:rPr lang="fr-CA" sz="4200" dirty="0"/>
+              <a:rPr lang="fr-CA" sz="4600" dirty="0">
+                <a:latin typeface="Calibri" panose="020F0502020204030204" pitchFamily="34" charset="0"/>
+              </a:rPr>
               <a:t>: h; }</a:t>
             </a:r>
           </a:p>
@@ -8854,10 +9677,14 @@
               <a:buNone/>
             </a:pPr>
             <a:br>
-              <a:rPr lang="fr-CA" sz="4200" dirty="0"/>
+              <a:rPr lang="fr-CA" sz="4600" dirty="0">
+                <a:latin typeface="Calibri" panose="020F0502020204030204" pitchFamily="34" charset="0"/>
+              </a:rPr>
             </a:br>
             <a:r>
-              <a:rPr lang="fr-CA" sz="4200" dirty="0"/>
+              <a:rPr lang="fr-CA" sz="4600" dirty="0">
+                <a:latin typeface="Calibri" panose="020F0502020204030204" pitchFamily="34" charset="0"/>
+              </a:rPr>
               <a:t>.menu {</a:t>
             </a:r>
           </a:p>
@@ -8866,31 +9693,36 @@
               <a:buNone/>
             </a:pPr>
             <a:r>
-              <a:rPr lang="fr-CA" sz="4200" dirty="0">
-                <a:solidFill>
-                  <a:srgbClr val="00B0F0"/>
-                </a:solidFill>
+              <a:rPr lang="fr-CA" sz="4600" dirty="0">
+                <a:solidFill>
+                  <a:srgbClr val="00B0F0"/>
+                </a:solidFill>
+                <a:latin typeface="Calibri" panose="020F0502020204030204" pitchFamily="34" charset="0"/>
               </a:rPr>
               <a:t>	</a:t>
             </a:r>
             <a:r>
-              <a:rPr lang="fr-CA" sz="4200" dirty="0" err="1">
-                <a:solidFill>
-                  <a:srgbClr val="00B0F0"/>
-                </a:solidFill>
+              <a:rPr lang="fr-CA" sz="4600" dirty="0" err="1">
+                <a:solidFill>
+                  <a:srgbClr val="00B0F0"/>
+                </a:solidFill>
+                <a:latin typeface="Calibri" panose="020F0502020204030204" pitchFamily="34" charset="0"/>
               </a:rPr>
               <a:t>grid</a:t>
             </a:r>
             <a:r>
-              <a:rPr lang="fr-CA" sz="4200" dirty="0">
-                <a:solidFill>
-                  <a:srgbClr val="00B0F0"/>
-                </a:solidFill>
+              <a:rPr lang="fr-CA" sz="4600" dirty="0">
+                <a:solidFill>
+                  <a:srgbClr val="00B0F0"/>
+                </a:solidFill>
+                <a:latin typeface="Calibri" panose="020F0502020204030204" pitchFamily="34" charset="0"/>
               </a:rPr>
               <a:t>-area</a:t>
             </a:r>
             <a:r>
-              <a:rPr lang="fr-CA" sz="4200" dirty="0"/>
+              <a:rPr lang="fr-CA" sz="4600" dirty="0">
+                <a:latin typeface="Calibri" panose="020F0502020204030204" pitchFamily="34" charset="0"/>
+              </a:rPr>
               <a:t>: m; }</a:t>
             </a:r>
           </a:p>
@@ -8899,10 +9731,14 @@
               <a:buNone/>
             </a:pPr>
             <a:br>
-              <a:rPr lang="fr-CA" sz="4200" dirty="0"/>
+              <a:rPr lang="fr-CA" sz="4600" dirty="0">
+                <a:latin typeface="Calibri" panose="020F0502020204030204" pitchFamily="34" charset="0"/>
+              </a:rPr>
             </a:br>
             <a:r>
-              <a:rPr lang="fr-CA" sz="4200" dirty="0"/>
+              <a:rPr lang="fr-CA" sz="4600" dirty="0">
+                <a:latin typeface="Calibri" panose="020F0502020204030204" pitchFamily="34" charset="0"/>
+              </a:rPr>
               <a:t>.content {</a:t>
             </a:r>
           </a:p>
@@ -8911,31 +9747,36 @@
               <a:buNone/>
             </a:pPr>
             <a:r>
-              <a:rPr lang="fr-CA" sz="4200" dirty="0">
-                <a:solidFill>
-                  <a:srgbClr val="00B0F0"/>
-                </a:solidFill>
+              <a:rPr lang="fr-CA" sz="4600" dirty="0">
+                <a:solidFill>
+                  <a:srgbClr val="00B0F0"/>
+                </a:solidFill>
+                <a:latin typeface="Calibri" panose="020F0502020204030204" pitchFamily="34" charset="0"/>
               </a:rPr>
               <a:t>	</a:t>
             </a:r>
             <a:r>
-              <a:rPr lang="fr-CA" sz="4200" dirty="0" err="1">
-                <a:solidFill>
-                  <a:srgbClr val="00B0F0"/>
-                </a:solidFill>
+              <a:rPr lang="fr-CA" sz="4600" dirty="0" err="1">
+                <a:solidFill>
+                  <a:srgbClr val="00B0F0"/>
+                </a:solidFill>
+                <a:latin typeface="Calibri" panose="020F0502020204030204" pitchFamily="34" charset="0"/>
               </a:rPr>
               <a:t>grid</a:t>
             </a:r>
             <a:r>
-              <a:rPr lang="fr-CA" sz="4200" dirty="0">
-                <a:solidFill>
-                  <a:srgbClr val="00B0F0"/>
-                </a:solidFill>
+              <a:rPr lang="fr-CA" sz="4600" dirty="0">
+                <a:solidFill>
+                  <a:srgbClr val="00B0F0"/>
+                </a:solidFill>
+                <a:latin typeface="Calibri" panose="020F0502020204030204" pitchFamily="34" charset="0"/>
               </a:rPr>
               <a:t>-area</a:t>
             </a:r>
             <a:r>
-              <a:rPr lang="fr-CA" sz="4200" dirty="0"/>
+              <a:rPr lang="fr-CA" sz="4600" dirty="0">
+                <a:latin typeface="Calibri" panose="020F0502020204030204" pitchFamily="34" charset="0"/>
+              </a:rPr>
               <a:t>: c; }</a:t>
             </a:r>
           </a:p>
@@ -8944,18 +9785,26 @@
               <a:buNone/>
             </a:pPr>
             <a:br>
-              <a:rPr lang="fr-CA" sz="4200" dirty="0"/>
+              <a:rPr lang="fr-CA" sz="4600" dirty="0">
+                <a:latin typeface="Calibri" panose="020F0502020204030204" pitchFamily="34" charset="0"/>
+              </a:rPr>
             </a:br>
             <a:r>
-              <a:rPr lang="fr-CA" sz="4200" dirty="0"/>
+              <a:rPr lang="fr-CA" sz="4600" dirty="0">
+                <a:latin typeface="Calibri" panose="020F0502020204030204" pitchFamily="34" charset="0"/>
+              </a:rPr>
               <a:t>.</a:t>
             </a:r>
             <a:r>
-              <a:rPr lang="fr-CA" sz="4200" dirty="0" err="1"/>
+              <a:rPr lang="fr-CA" sz="4600" dirty="0" err="1">
+                <a:latin typeface="Calibri" panose="020F0502020204030204" pitchFamily="34" charset="0"/>
+              </a:rPr>
               <a:t>footer</a:t>
             </a:r>
             <a:r>
-              <a:rPr lang="fr-CA" sz="4200" dirty="0"/>
+              <a:rPr lang="fr-CA" sz="4600" dirty="0">
+                <a:latin typeface="Calibri" panose="020F0502020204030204" pitchFamily="34" charset="0"/>
+              </a:rPr>
               <a:t> {</a:t>
             </a:r>
           </a:p>
@@ -8964,31 +9813,36 @@
               <a:buNone/>
             </a:pPr>
             <a:r>
-              <a:rPr lang="fr-CA" sz="4200" dirty="0">
-                <a:solidFill>
-                  <a:srgbClr val="00B0F0"/>
-                </a:solidFill>
+              <a:rPr lang="fr-CA" sz="4600" dirty="0">
+                <a:solidFill>
+                  <a:srgbClr val="00B0F0"/>
+                </a:solidFill>
+                <a:latin typeface="Calibri" panose="020F0502020204030204" pitchFamily="34" charset="0"/>
               </a:rPr>
               <a:t>	</a:t>
             </a:r>
             <a:r>
-              <a:rPr lang="fr-CA" sz="4200" dirty="0" err="1">
-                <a:solidFill>
-                  <a:srgbClr val="00B0F0"/>
-                </a:solidFill>
+              <a:rPr lang="fr-CA" sz="4600" dirty="0" err="1">
+                <a:solidFill>
+                  <a:srgbClr val="00B0F0"/>
+                </a:solidFill>
+                <a:latin typeface="Calibri" panose="020F0502020204030204" pitchFamily="34" charset="0"/>
               </a:rPr>
               <a:t>grid</a:t>
             </a:r>
             <a:r>
-              <a:rPr lang="fr-CA" sz="4200" dirty="0">
-                <a:solidFill>
-                  <a:srgbClr val="00B0F0"/>
-                </a:solidFill>
+              <a:rPr lang="fr-CA" sz="4600" dirty="0">
+                <a:solidFill>
+                  <a:srgbClr val="00B0F0"/>
+                </a:solidFill>
+                <a:latin typeface="Calibri" panose="020F0502020204030204" pitchFamily="34" charset="0"/>
               </a:rPr>
               <a:t>-area</a:t>
             </a:r>
             <a:r>
-              <a:rPr lang="fr-CA" sz="4200" dirty="0"/>
+              <a:rPr lang="fr-CA" sz="4600" dirty="0">
+                <a:latin typeface="Calibri" panose="020F0502020204030204" pitchFamily="34" charset="0"/>
+              </a:rPr>
               <a:t>: f; }</a:t>
             </a:r>
           </a:p>
@@ -9058,18 +9912,33 @@
             <a:pPr algn="ctr"/>
             <a:r>
               <a:rPr lang="fr-CA" sz="4400" dirty="0">
-                <a:latin typeface="Calibri" panose="020F0502020204030204" pitchFamily="34" charset="0"/>
-              </a:rPr>
-              <a:t>Auto-fit and </a:t>
+                <a:solidFill>
+                  <a:srgbClr val="00B0F0"/>
+                </a:solidFill>
+                <a:latin typeface="Calibri" panose="020F0502020204030204" pitchFamily="34" charset="0"/>
+              </a:rPr>
+              <a:t>Auto-fit</a:t>
+            </a:r>
+            <a:r>
+              <a:rPr lang="fr-CA" sz="4400" dirty="0">
+                <a:latin typeface="Calibri" panose="020F0502020204030204" pitchFamily="34" charset="0"/>
+              </a:rPr>
+              <a:t> and </a:t>
             </a:r>
             <a:r>
               <a:rPr lang="fr-CA" sz="4400" dirty="0" err="1">
+                <a:solidFill>
+                  <a:srgbClr val="00B0F0"/>
+                </a:solidFill>
                 <a:latin typeface="Calibri" panose="020F0502020204030204" pitchFamily="34" charset="0"/>
               </a:rPr>
               <a:t>minmax</a:t>
             </a:r>
             <a:r>
               <a:rPr lang="fr-CA" sz="4400" dirty="0">
+                <a:solidFill>
+                  <a:srgbClr val="00B0F0"/>
+                </a:solidFill>
                 <a:latin typeface="Calibri" panose="020F0502020204030204" pitchFamily="34" charset="0"/>
               </a:rPr>
               <a:t> </a:t>
@@ -9095,24 +9964,24 @@
         </p:nvSpPr>
         <p:spPr>
           <a:xfrm>
-            <a:off x="379562" y="1483743"/>
-            <a:ext cx="10974238" cy="5193102"/>
+            <a:off x="379562" y="1112520"/>
+            <a:ext cx="10974238" cy="5745480"/>
           </a:xfrm>
         </p:spPr>
         <p:txBody>
           <a:bodyPr>
-            <a:normAutofit fontScale="92500" lnSpcReduction="10000"/>
+            <a:normAutofit fontScale="70000" lnSpcReduction="20000"/>
           </a:bodyPr>
           <a:lstStyle/>
           <a:p>
             <a:pPr marL="0" indent="0">
               <a:lnSpc>
-                <a:spcPct val="120000"/>
+                <a:spcPct val="170000"/>
               </a:lnSpc>
               <a:buNone/>
             </a:pPr>
             <a:r>
-              <a:rPr lang="fr-CA" sz="3500" dirty="0">
+              <a:rPr lang="fr-CA" sz="4100" dirty="0">
                 <a:latin typeface="Calibri" panose="020F0502020204030204" pitchFamily="34" charset="0"/>
               </a:rPr>
               <a:t>.container {</a:t>
@@ -9121,24 +9990,24 @@
           <a:p>
             <a:pPr marL="0" indent="0">
               <a:lnSpc>
-                <a:spcPct val="120000"/>
+                <a:spcPct val="170000"/>
               </a:lnSpc>
               <a:buNone/>
             </a:pPr>
             <a:r>
-              <a:rPr lang="fr-CA" sz="3500" b="1" dirty="0">
+              <a:rPr lang="fr-CA" sz="4100" b="1" dirty="0">
                 <a:latin typeface="Calibri" panose="020F0502020204030204" pitchFamily="34" charset="0"/>
               </a:rPr>
               <a:t>	</a:t>
             </a:r>
             <a:r>
-              <a:rPr lang="fr-CA" sz="3500" dirty="0">
+              <a:rPr lang="fr-CA" sz="4100" dirty="0">
                 <a:latin typeface="Calibri" panose="020F0502020204030204" pitchFamily="34" charset="0"/>
               </a:rPr>
               <a:t>display: </a:t>
             </a:r>
             <a:r>
-              <a:rPr lang="fr-CA" sz="3500" dirty="0" err="1">
+              <a:rPr lang="fr-CA" sz="4100" dirty="0" err="1">
                 <a:solidFill>
                   <a:srgbClr val="00B0F0"/>
                 </a:solidFill>
@@ -9147,7 +10016,7 @@
               <a:t>grid</a:t>
             </a:r>
             <a:r>
-              <a:rPr lang="fr-CA" sz="3500" dirty="0">
+              <a:rPr lang="fr-CA" sz="4100" dirty="0">
                 <a:latin typeface="Calibri" panose="020F0502020204030204" pitchFamily="34" charset="0"/>
               </a:rPr>
               <a:t>;</a:t>
@@ -9156,18 +10025,18 @@
           <a:p>
             <a:pPr marL="0" indent="0">
               <a:lnSpc>
-                <a:spcPct val="120000"/>
+                <a:spcPct val="170000"/>
               </a:lnSpc>
               <a:buNone/>
             </a:pPr>
             <a:r>
-              <a:rPr lang="fr-CA" sz="3500" b="1" dirty="0">
+              <a:rPr lang="fr-CA" sz="4100" b="1" dirty="0">
                 <a:latin typeface="Calibri" panose="020F0502020204030204" pitchFamily="34" charset="0"/>
               </a:rPr>
               <a:t>	</a:t>
             </a:r>
             <a:r>
-              <a:rPr lang="fr-CA" sz="3500" dirty="0" err="1">
+              <a:rPr lang="fr-CA" sz="4100" dirty="0" err="1">
                 <a:solidFill>
                   <a:srgbClr val="00B0F0"/>
                 </a:solidFill>
@@ -9176,7 +10045,7 @@
               <a:t>grid</a:t>
             </a:r>
             <a:r>
-              <a:rPr lang="fr-CA" sz="3500" dirty="0">
+              <a:rPr lang="fr-CA" sz="4100" dirty="0">
                 <a:solidFill>
                   <a:srgbClr val="00B0F0"/>
                 </a:solidFill>
@@ -9185,7 +10054,7 @@
               <a:t>-gap</a:t>
             </a:r>
             <a:r>
-              <a:rPr lang="fr-CA" sz="3500" dirty="0">
+              <a:rPr lang="fr-CA" sz="4100" dirty="0">
                 <a:latin typeface="Calibri" panose="020F0502020204030204" pitchFamily="34" charset="0"/>
               </a:rPr>
               <a:t>: 5px;</a:t>
@@ -9194,18 +10063,18 @@
           <a:p>
             <a:pPr marL="0" indent="0">
               <a:lnSpc>
-                <a:spcPct val="120000"/>
+                <a:spcPct val="170000"/>
               </a:lnSpc>
               <a:buNone/>
             </a:pPr>
             <a:r>
-              <a:rPr lang="fr-CA" sz="3500" b="1" dirty="0">
+              <a:rPr lang="fr-CA" sz="4100" b="1" dirty="0">
                 <a:latin typeface="Calibri" panose="020F0502020204030204" pitchFamily="34" charset="0"/>
               </a:rPr>
               <a:t>	</a:t>
             </a:r>
             <a:r>
-              <a:rPr lang="fr-CA" sz="3500" dirty="0" err="1">
+              <a:rPr lang="fr-CA" sz="4100" dirty="0" err="1">
                 <a:solidFill>
                   <a:srgbClr val="00B0F0"/>
                 </a:solidFill>
@@ -9214,31 +10083,31 @@
               <a:t>grid-template-columns</a:t>
             </a:r>
             <a:r>
-              <a:rPr lang="fr-CA" sz="3500" dirty="0">
+              <a:rPr lang="fr-CA" sz="4100" dirty="0">
                 <a:latin typeface="Calibri" panose="020F0502020204030204" pitchFamily="34" charset="0"/>
               </a:rPr>
               <a:t>: </a:t>
             </a:r>
             <a:r>
-              <a:rPr lang="fr-CA" sz="3500" dirty="0" err="1">
+              <a:rPr lang="fr-CA" sz="4100" dirty="0" err="1">
                 <a:latin typeface="Calibri" panose="020F0502020204030204" pitchFamily="34" charset="0"/>
               </a:rPr>
               <a:t>repeat</a:t>
             </a:r>
             <a:r>
-              <a:rPr lang="fr-CA" sz="3500" dirty="0">
+              <a:rPr lang="fr-CA" sz="4100" dirty="0">
                 <a:latin typeface="Calibri" panose="020F0502020204030204" pitchFamily="34" charset="0"/>
               </a:rPr>
               <a:t>(auto-fit, </a:t>
             </a:r>
             <a:r>
-              <a:rPr lang="fr-CA" sz="3500" dirty="0" err="1">
+              <a:rPr lang="fr-CA" sz="4100" dirty="0" err="1">
                 <a:latin typeface="Calibri" panose="020F0502020204030204" pitchFamily="34" charset="0"/>
               </a:rPr>
               <a:t>minmax</a:t>
             </a:r>
             <a:r>
-              <a:rPr lang="fr-CA" sz="3500" dirty="0">
+              <a:rPr lang="fr-CA" sz="4100" dirty="0">
                 <a:latin typeface="Calibri" panose="020F0502020204030204" pitchFamily="34" charset="0"/>
               </a:rPr>
               <a:t>(100px, 1fr));</a:t>
@@ -9247,18 +10116,18 @@
           <a:p>
             <a:pPr marL="0" indent="0">
               <a:lnSpc>
-                <a:spcPct val="120000"/>
+                <a:spcPct val="170000"/>
               </a:lnSpc>
               <a:buNone/>
             </a:pPr>
             <a:r>
-              <a:rPr lang="fr-CA" sz="3500" b="1" dirty="0">
+              <a:rPr lang="fr-CA" sz="4100" b="1" dirty="0">
                 <a:latin typeface="Calibri" panose="020F0502020204030204" pitchFamily="34" charset="0"/>
               </a:rPr>
               <a:t>	</a:t>
             </a:r>
             <a:r>
-              <a:rPr lang="fr-CA" sz="3500" dirty="0" err="1">
+              <a:rPr lang="fr-CA" sz="4100" dirty="0" err="1">
                 <a:solidFill>
                   <a:srgbClr val="00B0F0"/>
                 </a:solidFill>
@@ -9267,19 +10136,19 @@
               <a:t>grid-template-rows</a:t>
             </a:r>
             <a:r>
-              <a:rPr lang="fr-CA" sz="3500" dirty="0">
+              <a:rPr lang="fr-CA" sz="4100" dirty="0">
                 <a:latin typeface="Calibri" panose="020F0502020204030204" pitchFamily="34" charset="0"/>
               </a:rPr>
               <a:t>: </a:t>
             </a:r>
             <a:r>
-              <a:rPr lang="fr-CA" sz="3500" dirty="0" err="1">
+              <a:rPr lang="fr-CA" sz="4100" dirty="0" err="1">
                 <a:latin typeface="Calibri" panose="020F0502020204030204" pitchFamily="34" charset="0"/>
               </a:rPr>
               <a:t>repeat</a:t>
             </a:r>
             <a:r>
-              <a:rPr lang="fr-CA" sz="3500" dirty="0">
+              <a:rPr lang="fr-CA" sz="4100" dirty="0">
                 <a:latin typeface="Calibri" panose="020F0502020204030204" pitchFamily="34" charset="0"/>
               </a:rPr>
               <a:t>(2, 100px);</a:t>
@@ -9288,12 +10157,12 @@
           <a:p>
             <a:pPr marL="0" indent="0">
               <a:lnSpc>
-                <a:spcPct val="120000"/>
+                <a:spcPct val="170000"/>
               </a:lnSpc>
               <a:buNone/>
             </a:pPr>
             <a:r>
-              <a:rPr lang="fr-CA" sz="3500" dirty="0">
+              <a:rPr lang="fr-CA" sz="4100" dirty="0">
                 <a:latin typeface="Calibri" panose="020F0502020204030204" pitchFamily="34" charset="0"/>
               </a:rPr>
               <a:t>}</a:t>
@@ -9364,7 +10233,7 @@
         </p:nvSpPr>
         <p:spPr>
           <a:xfrm>
-            <a:off x="838200" y="365126"/>
+            <a:off x="838200" y="213361"/>
             <a:ext cx="10515600" cy="859826"/>
           </a:xfrm>
         </p:spPr>
@@ -9377,6 +10246,9 @@
             <a:pPr algn="ctr"/>
             <a:r>
               <a:rPr lang="fr-CA" sz="4400" dirty="0" err="1">
+                <a:solidFill>
+                  <a:srgbClr val="00B0F0"/>
+                </a:solidFill>
                 <a:latin typeface="Calibri" panose="020F0502020204030204" pitchFamily="34" charset="0"/>
               </a:rPr>
               <a:t>Implicit</a:t>
@@ -9420,17 +10292,19 @@
         </p:nvSpPr>
         <p:spPr>
           <a:xfrm>
-            <a:off x="258792" y="1604513"/>
-            <a:ext cx="11576650" cy="4727276"/>
+            <a:off x="258792" y="1188720"/>
+            <a:ext cx="11576650" cy="5455919"/>
           </a:xfrm>
         </p:spPr>
         <p:txBody>
-          <a:bodyPr/>
+          <a:bodyPr>
+            <a:normAutofit/>
+          </a:bodyPr>
           <a:lstStyle/>
           <a:p>
             <a:pPr marL="0" indent="0">
               <a:lnSpc>
-                <a:spcPct val="100000"/>
+                <a:spcPct val="150000"/>
               </a:lnSpc>
               <a:buNone/>
             </a:pPr>
@@ -9444,7 +10318,7 @@
           <a:p>
             <a:pPr marL="0" indent="0">
               <a:lnSpc>
-                <a:spcPct val="100000"/>
+                <a:spcPct val="150000"/>
               </a:lnSpc>
               <a:buNone/>
             </a:pPr>
@@ -9479,7 +10353,7 @@
           <a:p>
             <a:pPr marL="0" indent="0">
               <a:lnSpc>
-                <a:spcPct val="100000"/>
+                <a:spcPct val="150000"/>
               </a:lnSpc>
               <a:buNone/>
             </a:pPr>
@@ -9517,7 +10391,7 @@
           <a:p>
             <a:pPr marL="0" indent="0">
               <a:lnSpc>
-                <a:spcPct val="100000"/>
+                <a:spcPct val="150000"/>
               </a:lnSpc>
               <a:buNone/>
             </a:pPr>
@@ -9582,7 +10456,7 @@
           <a:p>
             <a:pPr marL="0" indent="0">
               <a:lnSpc>
-                <a:spcPct val="100000"/>
+                <a:spcPct val="150000"/>
               </a:lnSpc>
               <a:buNone/>
             </a:pPr>
@@ -9629,7 +10503,7 @@
           <a:p>
             <a:pPr marL="0" indent="0">
               <a:lnSpc>
-                <a:spcPct val="100000"/>
+                <a:spcPct val="150000"/>
               </a:lnSpc>
               <a:buNone/>
             </a:pPr>
@@ -9677,10 +10551,10 @@
       </p:grpSpPr>
       <p:sp>
         <p:nvSpPr>
-          <p:cNvPr id="2" name="Titre 1">
+          <p:cNvPr id="3" name="Espace réservé du contenu 2">
             <a:extLst>
               <a:ext uri="{FF2B5EF4-FFF2-40B4-BE49-F238E27FC236}">
-                <a16:creationId xmlns:a16="http://schemas.microsoft.com/office/drawing/2014/main" id="{AEBE8C85-A202-4E28-8822-413909FCAA9E}"/>
+                <a16:creationId xmlns:a16="http://schemas.microsoft.com/office/drawing/2014/main" id="{0F210829-D259-40CC-9EB7-377BA6FCD516}"/>
               </a:ext>
             </a:extLst>
           </p:cNvPr>
@@ -9688,643 +10562,37 @@
             <a:spLocks noGrp="1"/>
           </p:cNvSpPr>
           <p:nvPr>
-            <p:ph type="title"/>
+            <p:ph idx="1"/>
           </p:nvPr>
         </p:nvSpPr>
         <p:spPr>
           <a:xfrm>
-            <a:off x="838200" y="250166"/>
-            <a:ext cx="10515600" cy="957530"/>
+            <a:off x="966152" y="2799679"/>
+            <a:ext cx="8946541" cy="1955202"/>
           </a:xfrm>
         </p:spPr>
         <p:txBody>
           <a:bodyPr>
-            <a:noAutofit/>
+            <a:normAutofit/>
           </a:bodyPr>
           <a:lstStyle/>
           <a:p>
-            <a:pPr algn="ctr"/>
-            <a:r>
-              <a:rPr lang="en-US" sz="4400" dirty="0">
-                <a:latin typeface="Calibri" panose="020F0502020204030204" pitchFamily="34" charset="0"/>
-              </a:rPr>
-              <a:t>justify-items and align-items</a:t>
-            </a:r>
-            <a:endParaRPr lang="fr-CA" sz="4400" dirty="0">
-              <a:latin typeface="Calibri" panose="020F0502020204030204" pitchFamily="34" charset="0"/>
-            </a:endParaRPr>
-          </a:p>
-        </p:txBody>
-      </p:sp>
-      <p:sp>
-        <p:nvSpPr>
-          <p:cNvPr id="3" name="Espace réservé du contenu 2">
-            <a:extLst>
-              <a:ext uri="{FF2B5EF4-FFF2-40B4-BE49-F238E27FC236}">
-                <a16:creationId xmlns:a16="http://schemas.microsoft.com/office/drawing/2014/main" id="{FF8ABBCD-8F64-4348-8846-2D6065022E1A}"/>
-              </a:ext>
-            </a:extLst>
-          </p:cNvPr>
-          <p:cNvSpPr>
-            <a:spLocks noGrp="1"/>
-          </p:cNvSpPr>
-          <p:nvPr>
-            <p:ph sz="half" idx="1"/>
-          </p:nvPr>
-        </p:nvSpPr>
-        <p:spPr>
-          <a:xfrm>
-            <a:off x="258792" y="1207697"/>
-            <a:ext cx="6038491" cy="5400137"/>
-          </a:xfrm>
-        </p:spPr>
-        <p:txBody>
-          <a:bodyPr>
-            <a:normAutofit fontScale="32500" lnSpcReduction="20000"/>
-          </a:bodyPr>
-          <a:lstStyle/>
-          <a:p>
-            <a:pPr marL="0" lvl="0" indent="0">
-              <a:buNone/>
-            </a:pPr>
-            <a:r>
-              <a:rPr lang="fr-CA" sz="8000" dirty="0">
-                <a:latin typeface="Calibri" panose="020F0502020204030204" pitchFamily="34" charset="0"/>
-              </a:rPr>
-              <a:t>.container {</a:t>
-            </a:r>
-          </a:p>
-          <a:p>
-            <a:pPr marL="0" lvl="0" indent="0">
-              <a:buNone/>
-            </a:pPr>
-            <a:r>
-              <a:rPr lang="fr-CA" sz="8000" dirty="0">
-                <a:latin typeface="Calibri" panose="020F0502020204030204" pitchFamily="34" charset="0"/>
-              </a:rPr>
-              <a:t>	</a:t>
-            </a:r>
-            <a:r>
-              <a:rPr lang="fr-CA" sz="8000" dirty="0" err="1">
-                <a:latin typeface="Calibri" panose="020F0502020204030204" pitchFamily="34" charset="0"/>
-              </a:rPr>
-              <a:t>height</a:t>
-            </a:r>
-            <a:r>
-              <a:rPr lang="fr-CA" sz="8000" dirty="0">
-                <a:latin typeface="Calibri" panose="020F0502020204030204" pitchFamily="34" charset="0"/>
-              </a:rPr>
-              <a:t>: 100%; </a:t>
-            </a:r>
-          </a:p>
-          <a:p>
-            <a:pPr marL="0" lvl="0" indent="0">
-              <a:buNone/>
-            </a:pPr>
-            <a:r>
-              <a:rPr lang="fr-CA" sz="8000" dirty="0">
-                <a:latin typeface="Calibri" panose="020F0502020204030204" pitchFamily="34" charset="0"/>
-              </a:rPr>
-              <a:t>	display: </a:t>
-            </a:r>
-            <a:r>
-              <a:rPr lang="fr-CA" sz="8000" dirty="0" err="1">
-                <a:solidFill>
-                  <a:srgbClr val="00B0F0"/>
-                </a:solidFill>
-                <a:latin typeface="Calibri" panose="020F0502020204030204" pitchFamily="34" charset="0"/>
-              </a:rPr>
-              <a:t>grid</a:t>
-            </a:r>
-            <a:r>
-              <a:rPr lang="fr-CA" sz="8000" dirty="0">
-                <a:latin typeface="Calibri" panose="020F0502020204030204" pitchFamily="34" charset="0"/>
-              </a:rPr>
-              <a:t>;</a:t>
-            </a:r>
-          </a:p>
-          <a:p>
-            <a:pPr marL="0" lvl="0" indent="0">
-              <a:buNone/>
-            </a:pPr>
-            <a:r>
-              <a:rPr lang="fr-CA" sz="8000" dirty="0">
-                <a:solidFill>
-                  <a:srgbClr val="00B0F0"/>
-                </a:solidFill>
-                <a:latin typeface="Calibri" panose="020F0502020204030204" pitchFamily="34" charset="0"/>
-              </a:rPr>
-              <a:t>	</a:t>
-            </a:r>
-            <a:r>
-              <a:rPr lang="fr-CA" sz="8000" dirty="0" err="1">
-                <a:solidFill>
-                  <a:srgbClr val="00B0F0"/>
-                </a:solidFill>
-                <a:latin typeface="Calibri" panose="020F0502020204030204" pitchFamily="34" charset="0"/>
-              </a:rPr>
-              <a:t>grid</a:t>
-            </a:r>
-            <a:r>
-              <a:rPr lang="fr-CA" sz="8000" dirty="0">
-                <a:solidFill>
-                  <a:srgbClr val="00B0F0"/>
-                </a:solidFill>
-                <a:latin typeface="Calibri" panose="020F0502020204030204" pitchFamily="34" charset="0"/>
-              </a:rPr>
-              <a:t>-gap</a:t>
-            </a:r>
-            <a:r>
-              <a:rPr lang="fr-CA" sz="8000" dirty="0">
-                <a:latin typeface="Calibri" panose="020F0502020204030204" pitchFamily="34" charset="0"/>
-              </a:rPr>
-              <a:t>: 3px;</a:t>
-            </a:r>
-          </a:p>
-          <a:p>
-            <a:pPr marL="0" lvl="0" indent="0">
-              <a:buNone/>
-            </a:pPr>
-            <a:r>
-              <a:rPr lang="fr-CA" sz="8000" dirty="0">
-                <a:solidFill>
-                  <a:srgbClr val="00B0F0"/>
-                </a:solidFill>
-                <a:latin typeface="Calibri" panose="020F0502020204030204" pitchFamily="34" charset="0"/>
-              </a:rPr>
-              <a:t>	</a:t>
-            </a:r>
-            <a:r>
-              <a:rPr lang="fr-CA" sz="8000" dirty="0" err="1">
-                <a:solidFill>
-                  <a:srgbClr val="00B0F0"/>
-                </a:solidFill>
-                <a:latin typeface="Calibri" panose="020F0502020204030204" pitchFamily="34" charset="0"/>
-              </a:rPr>
-              <a:t>grid-template-columns</a:t>
-            </a:r>
-            <a:r>
-              <a:rPr lang="fr-CA" sz="8000" dirty="0">
-                <a:latin typeface="Calibri" panose="020F0502020204030204" pitchFamily="34" charset="0"/>
-              </a:rPr>
-              <a:t>: </a:t>
-            </a:r>
-            <a:r>
-              <a:rPr lang="fr-CA" sz="8000" dirty="0" err="1">
-                <a:latin typeface="Calibri" panose="020F0502020204030204" pitchFamily="34" charset="0"/>
-              </a:rPr>
-              <a:t>repeat</a:t>
-            </a:r>
-            <a:r>
-              <a:rPr lang="fr-CA" sz="8000" dirty="0">
-                <a:latin typeface="Calibri" panose="020F0502020204030204" pitchFamily="34" charset="0"/>
-              </a:rPr>
-              <a:t>(12, 1fr);</a:t>
-            </a:r>
-          </a:p>
-          <a:p>
-            <a:pPr marL="0" lvl="0" indent="0">
-              <a:buNone/>
-            </a:pPr>
-            <a:r>
-              <a:rPr lang="fr-CA" sz="8000" dirty="0">
-                <a:solidFill>
-                  <a:srgbClr val="00B0F0"/>
-                </a:solidFill>
-                <a:latin typeface="Calibri" panose="020F0502020204030204" pitchFamily="34" charset="0"/>
-              </a:rPr>
-              <a:t>	</a:t>
-            </a:r>
-            <a:r>
-              <a:rPr lang="fr-CA" sz="8000" dirty="0" err="1">
-                <a:solidFill>
-                  <a:srgbClr val="00B0F0"/>
-                </a:solidFill>
-                <a:latin typeface="Calibri" panose="020F0502020204030204" pitchFamily="34" charset="0"/>
-              </a:rPr>
-              <a:t>grid-template-rows</a:t>
-            </a:r>
-            <a:r>
-              <a:rPr lang="fr-CA" sz="8000" dirty="0">
-                <a:latin typeface="Calibri" panose="020F0502020204030204" pitchFamily="34" charset="0"/>
-              </a:rPr>
-              <a:t>: 40px auto 40px;</a:t>
-            </a:r>
-          </a:p>
-          <a:p>
-            <a:pPr marL="0" lvl="0" indent="0">
-              <a:buNone/>
-            </a:pPr>
-            <a:r>
-              <a:rPr lang="fr-CA" sz="8000" dirty="0">
-                <a:latin typeface="Calibri" panose="020F0502020204030204" pitchFamily="34" charset="0"/>
-              </a:rPr>
-              <a:t>	//</a:t>
-            </a:r>
-            <a:r>
-              <a:rPr lang="fr-CA" sz="8000" dirty="0" err="1">
-                <a:solidFill>
-                  <a:srgbClr val="00B0F0"/>
-                </a:solidFill>
-                <a:latin typeface="Calibri" panose="020F0502020204030204" pitchFamily="34" charset="0"/>
-              </a:rPr>
-              <a:t>justify</a:t>
-            </a:r>
-            <a:r>
-              <a:rPr lang="fr-CA" sz="8000" dirty="0">
-                <a:solidFill>
-                  <a:srgbClr val="00B0F0"/>
-                </a:solidFill>
-                <a:latin typeface="Calibri" panose="020F0502020204030204" pitchFamily="34" charset="0"/>
-              </a:rPr>
-              <a:t>-items</a:t>
-            </a:r>
-            <a:r>
-              <a:rPr lang="fr-CA" sz="8000" dirty="0">
-                <a:latin typeface="Calibri" panose="020F0502020204030204" pitchFamily="34" charset="0"/>
-              </a:rPr>
-              <a:t>: center; start, end, </a:t>
-            </a:r>
-          </a:p>
-          <a:p>
-            <a:pPr marL="0" lvl="0" indent="0">
-              <a:buNone/>
-            </a:pPr>
-            <a:r>
-              <a:rPr lang="fr-CA" sz="8000" dirty="0">
-                <a:latin typeface="Calibri" panose="020F0502020204030204" pitchFamily="34" charset="0"/>
-              </a:rPr>
-              <a:t>	//</a:t>
-            </a:r>
-            <a:r>
-              <a:rPr lang="fr-CA" sz="8000" dirty="0" err="1">
-                <a:solidFill>
-                  <a:srgbClr val="00B0F0"/>
-                </a:solidFill>
-                <a:latin typeface="Calibri" panose="020F0502020204030204" pitchFamily="34" charset="0"/>
-              </a:rPr>
-              <a:t>align</a:t>
-            </a:r>
-            <a:r>
-              <a:rPr lang="fr-CA" sz="8000" dirty="0">
-                <a:solidFill>
-                  <a:srgbClr val="00B0F0"/>
-                </a:solidFill>
-                <a:latin typeface="Calibri" panose="020F0502020204030204" pitchFamily="34" charset="0"/>
-              </a:rPr>
-              <a:t>-items</a:t>
-            </a:r>
-            <a:r>
-              <a:rPr lang="fr-CA" sz="8000" dirty="0">
-                <a:latin typeface="Calibri" panose="020F0502020204030204" pitchFamily="34" charset="0"/>
-              </a:rPr>
-              <a:t>: center; start, end, </a:t>
-            </a:r>
-          </a:p>
-          <a:p>
-            <a:pPr marL="0" lvl="0" indent="0">
-              <a:buNone/>
-            </a:pPr>
-            <a:r>
-              <a:rPr lang="fr-CA" sz="8000" dirty="0">
-                <a:latin typeface="Calibri" panose="020F0502020204030204" pitchFamily="34" charset="0"/>
-              </a:rPr>
-              <a:t>}</a:t>
-            </a:r>
-          </a:p>
-          <a:p>
-            <a:pPr marL="0" lvl="0" indent="0">
-              <a:buNone/>
-            </a:pPr>
-            <a:r>
-              <a:rPr lang="fr-CA" sz="8000" dirty="0">
-                <a:latin typeface="Calibri" panose="020F0502020204030204" pitchFamily="34" charset="0"/>
-              </a:rPr>
-              <a:t>.header {</a:t>
-            </a:r>
-          </a:p>
-          <a:p>
-            <a:pPr marL="0" lvl="0" indent="0">
-              <a:buNone/>
-            </a:pPr>
-            <a:r>
-              <a:rPr lang="fr-CA" sz="8000" dirty="0">
-                <a:solidFill>
-                  <a:srgbClr val="00B0F0"/>
-                </a:solidFill>
-                <a:latin typeface="Calibri" panose="020F0502020204030204" pitchFamily="34" charset="0"/>
-              </a:rPr>
-              <a:t>	</a:t>
-            </a:r>
-            <a:r>
-              <a:rPr lang="fr-CA" sz="8000" dirty="0" err="1">
-                <a:solidFill>
-                  <a:srgbClr val="00B0F0"/>
-                </a:solidFill>
-                <a:latin typeface="Calibri" panose="020F0502020204030204" pitchFamily="34" charset="0"/>
-              </a:rPr>
-              <a:t>grid-column</a:t>
-            </a:r>
-            <a:r>
-              <a:rPr lang="fr-CA" sz="8000" dirty="0">
-                <a:latin typeface="Calibri" panose="020F0502020204030204" pitchFamily="34" charset="0"/>
-              </a:rPr>
-              <a:t>: 1 / -1;</a:t>
-            </a:r>
-          </a:p>
-          <a:p>
-            <a:pPr marL="0" lvl="0" indent="0">
-              <a:buNone/>
-            </a:pPr>
-            <a:r>
-              <a:rPr lang="fr-CA" sz="8000" dirty="0">
-                <a:latin typeface="Calibri" panose="020F0502020204030204" pitchFamily="34" charset="0"/>
-              </a:rPr>
-              <a:t>}</a:t>
-            </a:r>
-          </a:p>
-          <a:p>
-            <a:endParaRPr lang="fr-CA" dirty="0"/>
-          </a:p>
-        </p:txBody>
-      </p:sp>
-      <p:sp>
-        <p:nvSpPr>
-          <p:cNvPr id="4" name="Espace réservé du contenu 3">
-            <a:extLst>
-              <a:ext uri="{FF2B5EF4-FFF2-40B4-BE49-F238E27FC236}">
-                <a16:creationId xmlns:a16="http://schemas.microsoft.com/office/drawing/2014/main" id="{CC41EF5D-0998-4083-895A-7CDF177A7B49}"/>
-              </a:ext>
-            </a:extLst>
-          </p:cNvPr>
-          <p:cNvSpPr>
-            <a:spLocks noGrp="1"/>
-          </p:cNvSpPr>
-          <p:nvPr>
-            <p:ph sz="half" idx="2"/>
-          </p:nvPr>
-        </p:nvSpPr>
-        <p:spPr>
-          <a:xfrm>
-            <a:off x="6590581" y="1207697"/>
-            <a:ext cx="5342627" cy="5632048"/>
-          </a:xfrm>
-        </p:spPr>
-        <p:txBody>
-          <a:bodyPr>
-            <a:normAutofit fontScale="32500" lnSpcReduction="20000"/>
-          </a:bodyPr>
-          <a:lstStyle/>
-          <a:p>
-            <a:pPr marL="0" lvl="0" indent="0">
-              <a:buNone/>
-            </a:pPr>
-            <a:r>
-              <a:rPr lang="fr-CA" sz="8600" dirty="0">
-                <a:latin typeface="Calibri" panose="020F0502020204030204" pitchFamily="34" charset="0"/>
-              </a:rPr>
-              <a:t>.menu {</a:t>
-            </a:r>
-          </a:p>
-          <a:p>
-            <a:pPr marL="0" lvl="0" indent="0">
-              <a:buNone/>
-            </a:pPr>
-            <a:r>
-              <a:rPr lang="fr-CA" sz="8600" dirty="0">
-                <a:solidFill>
-                  <a:srgbClr val="00B0F0"/>
-                </a:solidFill>
-                <a:latin typeface="Calibri" panose="020F0502020204030204" pitchFamily="34" charset="0"/>
-              </a:rPr>
-              <a:t>	</a:t>
-            </a:r>
-            <a:r>
-              <a:rPr lang="fr-CA" sz="8600" dirty="0" err="1">
-                <a:solidFill>
-                  <a:srgbClr val="00B0F0"/>
-                </a:solidFill>
-                <a:latin typeface="Calibri" panose="020F0502020204030204" pitchFamily="34" charset="0"/>
-              </a:rPr>
-              <a:t>grid-column</a:t>
-            </a:r>
-            <a:r>
-              <a:rPr lang="fr-CA" sz="8600" b="1" dirty="0">
-                <a:latin typeface="Calibri" panose="020F0502020204030204" pitchFamily="34" charset="0"/>
-              </a:rPr>
-              <a:t>: </a:t>
-            </a:r>
-            <a:r>
-              <a:rPr lang="fr-CA" sz="8600" dirty="0">
-                <a:latin typeface="Calibri" panose="020F0502020204030204" pitchFamily="34" charset="0"/>
-              </a:rPr>
-              <a:t>1 / 3;}</a:t>
-            </a:r>
-          </a:p>
-          <a:p>
-            <a:pPr lvl="0"/>
-            <a:endParaRPr lang="fr-CA" sz="8600" dirty="0">
-              <a:latin typeface="Calibri" panose="020F0502020204030204" pitchFamily="34" charset="0"/>
-            </a:endParaRPr>
-          </a:p>
-          <a:p>
-            <a:pPr marL="0" lvl="0" indent="0">
-              <a:buNone/>
-            </a:pPr>
-            <a:r>
-              <a:rPr lang="fr-CA" sz="8600" dirty="0">
-                <a:latin typeface="Calibri" panose="020F0502020204030204" pitchFamily="34" charset="0"/>
-              </a:rPr>
-              <a:t>.content {</a:t>
-            </a:r>
-          </a:p>
-          <a:p>
-            <a:pPr marL="0" lvl="0" indent="0">
-              <a:buNone/>
-            </a:pPr>
-            <a:r>
-              <a:rPr lang="fr-CA" sz="8600" dirty="0">
-                <a:solidFill>
-                  <a:srgbClr val="00B0F0"/>
-                </a:solidFill>
-                <a:latin typeface="Calibri" panose="020F0502020204030204" pitchFamily="34" charset="0"/>
-              </a:rPr>
-              <a:t>	</a:t>
-            </a:r>
-            <a:r>
-              <a:rPr lang="fr-CA" sz="8600" dirty="0" err="1">
-                <a:solidFill>
-                  <a:srgbClr val="00B0F0"/>
-                </a:solidFill>
-                <a:latin typeface="Calibri" panose="020F0502020204030204" pitchFamily="34" charset="0"/>
-              </a:rPr>
-              <a:t>grid-column</a:t>
-            </a:r>
-            <a:r>
-              <a:rPr lang="fr-CA" sz="8600" dirty="0">
-                <a:latin typeface="Calibri" panose="020F0502020204030204" pitchFamily="34" charset="0"/>
-              </a:rPr>
-              <a:t>: 3 / -1;</a:t>
-            </a:r>
-          </a:p>
-          <a:p>
-            <a:pPr marL="0" lvl="0" indent="0">
-              <a:buNone/>
-            </a:pPr>
-            <a:r>
-              <a:rPr lang="fr-CA" sz="8600" dirty="0">
-                <a:latin typeface="Calibri" panose="020F0502020204030204" pitchFamily="34" charset="0"/>
-              </a:rPr>
-              <a:t>	// </a:t>
-            </a:r>
-            <a:r>
-              <a:rPr lang="fr-CA" sz="8600" dirty="0" err="1">
-                <a:solidFill>
-                  <a:srgbClr val="00B0F0"/>
-                </a:solidFill>
-                <a:latin typeface="Calibri" panose="020F0502020204030204" pitchFamily="34" charset="0"/>
-              </a:rPr>
-              <a:t>justify</a:t>
-            </a:r>
-            <a:r>
-              <a:rPr lang="fr-CA" sz="8600" dirty="0">
-                <a:solidFill>
-                  <a:srgbClr val="00B0F0"/>
-                </a:solidFill>
-                <a:latin typeface="Calibri" panose="020F0502020204030204" pitchFamily="34" charset="0"/>
-              </a:rPr>
-              <a:t>-self</a:t>
-            </a:r>
-            <a:r>
-              <a:rPr lang="fr-CA" sz="8600" dirty="0">
-                <a:latin typeface="Calibri" panose="020F0502020204030204" pitchFamily="34" charset="0"/>
-              </a:rPr>
-              <a:t>: center;</a:t>
-            </a:r>
-          </a:p>
-          <a:p>
-            <a:pPr marL="0" lvl="0" indent="0">
-              <a:buNone/>
-            </a:pPr>
-            <a:r>
-              <a:rPr lang="fr-CA" sz="8600" dirty="0">
-                <a:latin typeface="Calibri" panose="020F0502020204030204" pitchFamily="34" charset="0"/>
-              </a:rPr>
-              <a:t> 	// </a:t>
-            </a:r>
-            <a:r>
-              <a:rPr lang="fr-CA" sz="8600" dirty="0" err="1">
-                <a:solidFill>
-                  <a:srgbClr val="00B0F0"/>
-                </a:solidFill>
-                <a:latin typeface="Calibri" panose="020F0502020204030204" pitchFamily="34" charset="0"/>
-              </a:rPr>
-              <a:t>align</a:t>
-            </a:r>
-            <a:r>
-              <a:rPr lang="fr-CA" sz="8600" dirty="0">
-                <a:solidFill>
-                  <a:srgbClr val="00B0F0"/>
-                </a:solidFill>
-                <a:latin typeface="Calibri" panose="020F0502020204030204" pitchFamily="34" charset="0"/>
-              </a:rPr>
-              <a:t>-self</a:t>
-            </a:r>
-            <a:r>
-              <a:rPr lang="fr-CA" sz="8600" dirty="0">
-                <a:latin typeface="Calibri" panose="020F0502020204030204" pitchFamily="34" charset="0"/>
-              </a:rPr>
-              <a:t>: end;</a:t>
-            </a:r>
-          </a:p>
-          <a:p>
-            <a:pPr marL="0" lvl="0" indent="0">
-              <a:buNone/>
-            </a:pPr>
-            <a:r>
-              <a:rPr lang="fr-CA" sz="8600" dirty="0">
-                <a:latin typeface="Calibri" panose="020F0502020204030204" pitchFamily="34" charset="0"/>
-              </a:rPr>
-              <a:t>}</a:t>
-            </a:r>
-          </a:p>
-          <a:p>
-            <a:pPr marL="0" lvl="0" indent="0">
-              <a:buNone/>
-            </a:pPr>
-            <a:br>
-              <a:rPr lang="fr-CA" sz="8600" dirty="0">
-                <a:latin typeface="Calibri" panose="020F0502020204030204" pitchFamily="34" charset="0"/>
-              </a:rPr>
-            </a:br>
-            <a:r>
-              <a:rPr lang="fr-CA" sz="8600" dirty="0">
-                <a:latin typeface="Calibri" panose="020F0502020204030204" pitchFamily="34" charset="0"/>
-              </a:rPr>
-              <a:t>.</a:t>
-            </a:r>
-            <a:r>
-              <a:rPr lang="fr-CA" sz="8600" dirty="0" err="1">
-                <a:latin typeface="Calibri" panose="020F0502020204030204" pitchFamily="34" charset="0"/>
-              </a:rPr>
-              <a:t>footer</a:t>
-            </a:r>
-            <a:r>
-              <a:rPr lang="fr-CA" sz="8600" dirty="0">
-                <a:latin typeface="Calibri" panose="020F0502020204030204" pitchFamily="34" charset="0"/>
-              </a:rPr>
-              <a:t> {</a:t>
-            </a:r>
-          </a:p>
-          <a:p>
-            <a:pPr marL="0" lvl="0" indent="0">
-              <a:buNone/>
-            </a:pPr>
-            <a:r>
-              <a:rPr lang="fr-CA" sz="8600" dirty="0">
-                <a:solidFill>
-                  <a:srgbClr val="00B0F0"/>
-                </a:solidFill>
-                <a:latin typeface="Calibri" panose="020F0502020204030204" pitchFamily="34" charset="0"/>
-              </a:rPr>
-              <a:t>	</a:t>
-            </a:r>
-            <a:r>
-              <a:rPr lang="fr-CA" sz="8600" dirty="0" err="1">
-                <a:solidFill>
-                  <a:srgbClr val="00B0F0"/>
-                </a:solidFill>
-                <a:latin typeface="Calibri" panose="020F0502020204030204" pitchFamily="34" charset="0"/>
-              </a:rPr>
-              <a:t>grid-column</a:t>
-            </a:r>
-            <a:r>
-              <a:rPr lang="fr-CA" sz="8600" dirty="0">
-                <a:latin typeface="Calibri" panose="020F0502020204030204" pitchFamily="34" charset="0"/>
-              </a:rPr>
-              <a:t>: 1 / -1;</a:t>
-            </a:r>
-          </a:p>
-          <a:p>
-            <a:pPr marL="0" lvl="0" indent="0">
-              <a:buNone/>
-            </a:pPr>
-            <a:r>
-              <a:rPr lang="fr-CA" sz="8600" dirty="0">
-                <a:latin typeface="Calibri" panose="020F0502020204030204" pitchFamily="34" charset="0"/>
-              </a:rPr>
-              <a:t>}</a:t>
-            </a:r>
-          </a:p>
-          <a:p>
-            <a:endParaRPr lang="fr-CA" dirty="0"/>
+            <a:pPr marL="0" indent="0">
+              <a:buNone/>
+            </a:pPr>
+            <a:r>
+              <a:rPr lang="fr-CA" sz="6000" dirty="0">
+                <a:latin typeface="Calibri" panose="020F0502020204030204" pitchFamily="34" charset="0"/>
+              </a:rPr>
+              <a:t>Practice Time</a:t>
+            </a:r>
           </a:p>
         </p:txBody>
       </p:sp>
     </p:spTree>
     <p:extLst>
       <p:ext uri="{BB962C8B-B14F-4D97-AF65-F5344CB8AC3E}">
-        <p14:creationId xmlns:p14="http://schemas.microsoft.com/office/powerpoint/2010/main" val="2424708951"/>
+        <p14:creationId xmlns:p14="http://schemas.microsoft.com/office/powerpoint/2010/main" val="3774394741"/>
       </p:ext>
     </p:extLst>
   </p:cSld>
@@ -10356,7 +10624,7 @@
           <p:cNvPr id="2" name="Titre 1">
             <a:extLst>
               <a:ext uri="{FF2B5EF4-FFF2-40B4-BE49-F238E27FC236}">
-                <a16:creationId xmlns:a16="http://schemas.microsoft.com/office/drawing/2014/main" id="{87149E10-A35F-4C63-B58C-310E89A08042}"/>
+                <a16:creationId xmlns:a16="http://schemas.microsoft.com/office/drawing/2014/main" id="{AEBE8C85-A202-4E28-8822-413909FCAA9E}"/>
               </a:ext>
             </a:extLst>
           </p:cNvPr>
@@ -10369,22 +10637,50 @@
         </p:nvSpPr>
         <p:spPr>
           <a:xfrm>
-            <a:off x="838200" y="267419"/>
-            <a:ext cx="10515600" cy="733245"/>
+            <a:off x="838200" y="250166"/>
+            <a:ext cx="10515600" cy="957530"/>
           </a:xfrm>
         </p:spPr>
         <p:txBody>
           <a:bodyPr>
-            <a:normAutofit fontScale="90000"/>
+            <a:noAutofit/>
           </a:bodyPr>
           <a:lstStyle/>
           <a:p>
             <a:pPr algn="ctr"/>
             <a:r>
-              <a:rPr lang="en-US" sz="4800" dirty="0"/>
-              <a:t>Awesome image grid</a:t>
-            </a:r>
-            <a:endParaRPr lang="fr-CA" sz="4800" dirty="0"/>
+              <a:rPr lang="en-US" sz="4400" dirty="0">
+                <a:solidFill>
+                  <a:srgbClr val="00B0F0"/>
+                </a:solidFill>
+                <a:latin typeface="Calibri" panose="020F0502020204030204" pitchFamily="34" charset="0"/>
+              </a:rPr>
+              <a:t>justify</a:t>
+            </a:r>
+            <a:r>
+              <a:rPr lang="en-US" sz="4400" dirty="0">
+                <a:latin typeface="Calibri" panose="020F0502020204030204" pitchFamily="34" charset="0"/>
+              </a:rPr>
+              <a:t>-items and </a:t>
+            </a:r>
+            <a:r>
+              <a:rPr lang="en-US" sz="4400" dirty="0">
+                <a:solidFill>
+                  <a:srgbClr val="00B0F0"/>
+                </a:solidFill>
+                <a:latin typeface="Calibri" panose="020F0502020204030204" pitchFamily="34" charset="0"/>
+              </a:rPr>
+              <a:t>align</a:t>
+            </a:r>
+            <a:r>
+              <a:rPr lang="en-US" sz="4400" dirty="0">
+                <a:latin typeface="Calibri" panose="020F0502020204030204" pitchFamily="34" charset="0"/>
+              </a:rPr>
+              <a:t>-items</a:t>
+            </a:r>
+            <a:endParaRPr lang="fr-CA" sz="4400" dirty="0">
+              <a:latin typeface="Calibri" panose="020F0502020204030204" pitchFamily="34" charset="0"/>
+            </a:endParaRPr>
           </a:p>
         </p:txBody>
       </p:sp>
@@ -10393,7 +10689,7 @@
           <p:cNvPr id="3" name="Espace réservé du contenu 2">
             <a:extLst>
               <a:ext uri="{FF2B5EF4-FFF2-40B4-BE49-F238E27FC236}">
-                <a16:creationId xmlns:a16="http://schemas.microsoft.com/office/drawing/2014/main" id="{85DC1803-F7EB-4A7D-913E-1556C0EA81C2}"/>
+                <a16:creationId xmlns:a16="http://schemas.microsoft.com/office/drawing/2014/main" id="{FF8ABBCD-8F64-4348-8846-2D6065022E1A}"/>
               </a:ext>
             </a:extLst>
           </p:cNvPr>
@@ -10406,38 +10702,61 @@
         </p:nvSpPr>
         <p:spPr>
           <a:xfrm>
-            <a:off x="270296" y="1276709"/>
-            <a:ext cx="6320286" cy="5451893"/>
+            <a:off x="258792" y="1207697"/>
+            <a:ext cx="6038491" cy="5400137"/>
           </a:xfrm>
         </p:spPr>
         <p:txBody>
           <a:bodyPr>
-            <a:normAutofit fontScale="62500" lnSpcReduction="20000"/>
+            <a:normAutofit fontScale="32500" lnSpcReduction="20000"/>
           </a:bodyPr>
           <a:lstStyle/>
           <a:p>
-            <a:pPr marL="0" indent="0">
-              <a:buNone/>
-            </a:pPr>
-            <a:r>
-              <a:rPr lang="fr-CA" sz="4100" dirty="0">
+            <a:pPr marL="0" lvl="0" indent="0">
+              <a:buNone/>
+            </a:pPr>
+            <a:r>
+              <a:rPr lang="fr-CA" sz="8000" dirty="0">
                 <a:latin typeface="Calibri" panose="020F0502020204030204" pitchFamily="34" charset="0"/>
               </a:rPr>
               <a:t>.container {</a:t>
             </a:r>
           </a:p>
           <a:p>
-            <a:pPr marL="0" indent="0">
-              <a:buNone/>
-            </a:pPr>
-            <a:r>
-              <a:rPr lang="fr-CA" sz="4100" dirty="0">
+            <a:pPr marL="0" lvl="0" indent="0">
+              <a:buNone/>
+            </a:pPr>
+            <a:r>
+              <a:rPr lang="fr-CA" sz="8000" dirty="0">
+                <a:latin typeface="Calibri" panose="020F0502020204030204" pitchFamily="34" charset="0"/>
+              </a:rPr>
+              <a:t>	</a:t>
+            </a:r>
+            <a:r>
+              <a:rPr lang="fr-CA" sz="8000" dirty="0" err="1">
+                <a:latin typeface="Calibri" panose="020F0502020204030204" pitchFamily="34" charset="0"/>
+              </a:rPr>
+              <a:t>height</a:t>
+            </a:r>
+            <a:r>
+              <a:rPr lang="fr-CA" sz="8000" dirty="0">
+                <a:latin typeface="Calibri" panose="020F0502020204030204" pitchFamily="34" charset="0"/>
+              </a:rPr>
+              <a:t>: 100%; </a:t>
+            </a:r>
+          </a:p>
+          <a:p>
+            <a:pPr marL="0" lvl="0" indent="0">
+              <a:buNone/>
+            </a:pPr>
+            <a:r>
+              <a:rPr lang="fr-CA" sz="8000" dirty="0">
                 <a:latin typeface="Calibri" panose="020F0502020204030204" pitchFamily="34" charset="0"/>
               </a:rPr>
               <a:t>	display: </a:t>
             </a:r>
             <a:r>
-              <a:rPr lang="fr-CA" sz="4100" dirty="0" err="1">
+              <a:rPr lang="fr-CA" sz="8000" dirty="0" err="1">
                 <a:solidFill>
                   <a:srgbClr val="00B0F0"/>
                 </a:solidFill>
@@ -10446,18 +10765,18 @@
               <a:t>grid</a:t>
             </a:r>
             <a:r>
-              <a:rPr lang="fr-CA" sz="4100" dirty="0">
+              <a:rPr lang="fr-CA" sz="8000" dirty="0">
                 <a:latin typeface="Calibri" panose="020F0502020204030204" pitchFamily="34" charset="0"/>
               </a:rPr>
               <a:t>;</a:t>
             </a:r>
           </a:p>
           <a:p>
-            <a:pPr marL="0" indent="0">
-              <a:buNone/>
-            </a:pPr>
-            <a:r>
-              <a:rPr lang="fr-CA" sz="4100" dirty="0">
+            <a:pPr marL="0" lvl="0" indent="0">
+              <a:buNone/>
+            </a:pPr>
+            <a:r>
+              <a:rPr lang="fr-CA" sz="8000" dirty="0">
                 <a:solidFill>
                   <a:srgbClr val="00B0F0"/>
                 </a:solidFill>
@@ -10466,7 +10785,7 @@
               <a:t>	</a:t>
             </a:r>
             <a:r>
-              <a:rPr lang="fr-CA" sz="4100" dirty="0" err="1">
+              <a:rPr lang="fr-CA" sz="8000" dirty="0" err="1">
                 <a:solidFill>
                   <a:srgbClr val="00B0F0"/>
                 </a:solidFill>
@@ -10475,7 +10794,7 @@
               <a:t>grid</a:t>
             </a:r>
             <a:r>
-              <a:rPr lang="fr-CA" sz="4100" dirty="0">
+              <a:rPr lang="fr-CA" sz="8000" dirty="0">
                 <a:solidFill>
                   <a:srgbClr val="00B0F0"/>
                 </a:solidFill>
@@ -10484,18 +10803,18 @@
               <a:t>-gap</a:t>
             </a:r>
             <a:r>
-              <a:rPr lang="fr-CA" sz="4100" dirty="0">
-                <a:latin typeface="Calibri" panose="020F0502020204030204" pitchFamily="34" charset="0"/>
-              </a:rPr>
-              <a:t>: 5px;</a:t>
-            </a:r>
-          </a:p>
-          <a:p>
-            <a:pPr marL="0" indent="0">
-              <a:buNone/>
-            </a:pPr>
-            <a:r>
-              <a:rPr lang="fr-CA" sz="4100" dirty="0">
+              <a:rPr lang="fr-CA" sz="8000" dirty="0">
+                <a:latin typeface="Calibri" panose="020F0502020204030204" pitchFamily="34" charset="0"/>
+              </a:rPr>
+              <a:t>: 3px;</a:t>
+            </a:r>
+          </a:p>
+          <a:p>
+            <a:pPr marL="0" lvl="0" indent="0">
+              <a:buNone/>
+            </a:pPr>
+            <a:r>
+              <a:rPr lang="fr-CA" sz="8000" dirty="0">
                 <a:solidFill>
                   <a:srgbClr val="00B0F0"/>
                 </a:solidFill>
@@ -10504,7 +10823,7 @@
               <a:t>	</a:t>
             </a:r>
             <a:r>
-              <a:rPr lang="fr-CA" sz="4100" dirty="0" err="1">
+              <a:rPr lang="fr-CA" sz="8000" dirty="0" err="1">
                 <a:solidFill>
                   <a:srgbClr val="00B0F0"/>
                 </a:solidFill>
@@ -10513,42 +10832,30 @@
               <a:t>grid-template-columns</a:t>
             </a:r>
             <a:r>
-              <a:rPr lang="fr-CA" sz="4100" dirty="0">
+              <a:rPr lang="fr-CA" sz="8000" dirty="0">
                 <a:latin typeface="Calibri" panose="020F0502020204030204" pitchFamily="34" charset="0"/>
               </a:rPr>
               <a:t>: </a:t>
             </a:r>
             <a:r>
-              <a:rPr lang="fr-CA" sz="4100" dirty="0" err="1">
+              <a:rPr lang="fr-CA" sz="8000" dirty="0" err="1">
                 <a:latin typeface="Calibri" panose="020F0502020204030204" pitchFamily="34" charset="0"/>
               </a:rPr>
               <a:t>repeat</a:t>
             </a:r>
             <a:r>
-              <a:rPr lang="fr-CA" sz="4100" dirty="0">
-                <a:latin typeface="Calibri" panose="020F0502020204030204" pitchFamily="34" charset="0"/>
-              </a:rPr>
-              <a:t>(auto-fit, 	</a:t>
-            </a:r>
-            <a:r>
-              <a:rPr lang="fr-CA" sz="4100" dirty="0" err="1">
-                <a:latin typeface="Calibri" panose="020F0502020204030204" pitchFamily="34" charset="0"/>
-              </a:rPr>
-              <a:t>minmax</a:t>
-            </a:r>
-            <a:r>
-              <a:rPr lang="fr-CA" sz="4100" dirty="0">
-                <a:latin typeface="Calibri" panose="020F0502020204030204" pitchFamily="34" charset="0"/>
-              </a:rPr>
-              <a:t>(100px, 1fr));</a:t>
-            </a:r>
-          </a:p>
-          <a:p>
-            <a:pPr marL="0" indent="0">
-              <a:buNone/>
-            </a:pPr>
-            <a:r>
-              <a:rPr lang="fr-CA" sz="4100" dirty="0">
+              <a:rPr lang="fr-CA" sz="8000" dirty="0">
+                <a:latin typeface="Calibri" panose="020F0502020204030204" pitchFamily="34" charset="0"/>
+              </a:rPr>
+              <a:t>(12, 1fr);</a:t>
+            </a:r>
+          </a:p>
+          <a:p>
+            <a:pPr marL="0" lvl="0" indent="0">
+              <a:buNone/>
+            </a:pPr>
+            <a:r>
+              <a:rPr lang="fr-CA" sz="8000" dirty="0">
                 <a:solidFill>
                   <a:srgbClr val="00B0F0"/>
                 </a:solidFill>
@@ -10557,45 +10864,119 @@
               <a:t>	</a:t>
             </a:r>
             <a:r>
-              <a:rPr lang="fr-CA" sz="4100" dirty="0" err="1">
-                <a:solidFill>
-                  <a:srgbClr val="00B0F0"/>
-                </a:solidFill>
-                <a:latin typeface="Calibri" panose="020F0502020204030204" pitchFamily="34" charset="0"/>
-              </a:rPr>
-              <a:t>grid</a:t>
-            </a:r>
-            <a:r>
-              <a:rPr lang="fr-CA" sz="4100" dirty="0">
-                <a:solidFill>
-                  <a:srgbClr val="00B0F0"/>
-                </a:solidFill>
-                <a:latin typeface="Calibri" panose="020F0502020204030204" pitchFamily="34" charset="0"/>
-              </a:rPr>
-              <a:t>-auto-</a:t>
-            </a:r>
-            <a:r>
-              <a:rPr lang="fr-CA" sz="4100" dirty="0" err="1">
-                <a:solidFill>
-                  <a:srgbClr val="00B0F0"/>
-                </a:solidFill>
-                <a:latin typeface="Calibri" panose="020F0502020204030204" pitchFamily="34" charset="0"/>
-              </a:rPr>
-              <a:t>rows</a:t>
-            </a:r>
-            <a:r>
-              <a:rPr lang="fr-CA" sz="4100" dirty="0">
-                <a:latin typeface="Calibri" panose="020F0502020204030204" pitchFamily="34" charset="0"/>
-              </a:rPr>
-              <a:t>: 75px;</a:t>
-            </a:r>
-          </a:p>
-          <a:p>
-            <a:pPr marL="0" indent="0">
-              <a:buNone/>
-            </a:pPr>
-            <a:r>
-              <a:rPr lang="fr-CA" sz="4100" dirty="0">
+              <a:rPr lang="fr-CA" sz="8000" dirty="0" err="1">
+                <a:solidFill>
+                  <a:srgbClr val="00B0F0"/>
+                </a:solidFill>
+                <a:latin typeface="Calibri" panose="020F0502020204030204" pitchFamily="34" charset="0"/>
+              </a:rPr>
+              <a:t>grid-template-rows</a:t>
+            </a:r>
+            <a:r>
+              <a:rPr lang="fr-CA" sz="8000" dirty="0">
+                <a:latin typeface="Calibri" panose="020F0502020204030204" pitchFamily="34" charset="0"/>
+              </a:rPr>
+              <a:t>: 40px auto 40px;</a:t>
+            </a:r>
+          </a:p>
+          <a:p>
+            <a:pPr marL="0" lvl="0" indent="0">
+              <a:buNone/>
+            </a:pPr>
+            <a:r>
+              <a:rPr lang="fr-CA" sz="8000" dirty="0">
+                <a:latin typeface="Calibri" panose="020F0502020204030204" pitchFamily="34" charset="0"/>
+              </a:rPr>
+              <a:t>	//</a:t>
+            </a:r>
+            <a:r>
+              <a:rPr lang="fr-CA" sz="8000" dirty="0" err="1">
+                <a:solidFill>
+                  <a:srgbClr val="00B0F0"/>
+                </a:solidFill>
+                <a:latin typeface="Calibri" panose="020F0502020204030204" pitchFamily="34" charset="0"/>
+              </a:rPr>
+              <a:t>justify</a:t>
+            </a:r>
+            <a:r>
+              <a:rPr lang="fr-CA" sz="8000" dirty="0">
+                <a:solidFill>
+                  <a:srgbClr val="00B0F0"/>
+                </a:solidFill>
+                <a:latin typeface="Calibri" panose="020F0502020204030204" pitchFamily="34" charset="0"/>
+              </a:rPr>
+              <a:t>-items</a:t>
+            </a:r>
+            <a:r>
+              <a:rPr lang="fr-CA" sz="8000" dirty="0">
+                <a:latin typeface="Calibri" panose="020F0502020204030204" pitchFamily="34" charset="0"/>
+              </a:rPr>
+              <a:t>: center/ start/ end, </a:t>
+            </a:r>
+          </a:p>
+          <a:p>
+            <a:pPr marL="0" lvl="0" indent="0">
+              <a:buNone/>
+            </a:pPr>
+            <a:r>
+              <a:rPr lang="fr-CA" sz="8000" dirty="0">
+                <a:latin typeface="Calibri" panose="020F0502020204030204" pitchFamily="34" charset="0"/>
+              </a:rPr>
+              <a:t>	//</a:t>
+            </a:r>
+            <a:r>
+              <a:rPr lang="fr-CA" sz="8000" dirty="0" err="1">
+                <a:solidFill>
+                  <a:srgbClr val="00B0F0"/>
+                </a:solidFill>
+                <a:latin typeface="Calibri" panose="020F0502020204030204" pitchFamily="34" charset="0"/>
+              </a:rPr>
+              <a:t>align</a:t>
+            </a:r>
+            <a:r>
+              <a:rPr lang="fr-CA" sz="8000" dirty="0">
+                <a:solidFill>
+                  <a:srgbClr val="00B0F0"/>
+                </a:solidFill>
+                <a:latin typeface="Calibri" panose="020F0502020204030204" pitchFamily="34" charset="0"/>
+              </a:rPr>
+              <a:t>-items</a:t>
+            </a:r>
+            <a:r>
+              <a:rPr lang="fr-CA" sz="8000" dirty="0">
+                <a:latin typeface="Calibri" panose="020F0502020204030204" pitchFamily="34" charset="0"/>
+              </a:rPr>
+              <a:t>: center/ start/ end, </a:t>
+            </a:r>
+          </a:p>
+          <a:p>
+            <a:pPr marL="0" lvl="0" indent="0">
+              <a:buNone/>
+            </a:pPr>
+            <a:r>
+              <a:rPr lang="fr-CA" sz="8000" dirty="0">
+                <a:latin typeface="Calibri" panose="020F0502020204030204" pitchFamily="34" charset="0"/>
+              </a:rPr>
+              <a:t>}</a:t>
+            </a:r>
+          </a:p>
+          <a:p>
+            <a:pPr marL="0" lvl="0" indent="0">
+              <a:buNone/>
+            </a:pPr>
+            <a:r>
+              <a:rPr lang="fr-CA" sz="8000" dirty="0">
+                <a:latin typeface="Calibri" panose="020F0502020204030204" pitchFamily="34" charset="0"/>
+              </a:rPr>
+              <a:t>.header {</a:t>
+            </a:r>
+          </a:p>
+          <a:p>
+            <a:pPr marL="0" lvl="0" indent="0">
+              <a:buNone/>
+            </a:pPr>
+            <a:r>
+              <a:rPr lang="fr-CA" sz="8000" dirty="0">
                 <a:solidFill>
                   <a:srgbClr val="00B0F0"/>
                 </a:solidFill>
@@ -10604,72 +10985,7 @@
               <a:t>	</a:t>
             </a:r>
             <a:r>
-              <a:rPr lang="fr-CA" sz="4100" dirty="0" err="1">
-                <a:solidFill>
-                  <a:srgbClr val="00B0F0"/>
-                </a:solidFill>
-                <a:latin typeface="Calibri" panose="020F0502020204030204" pitchFamily="34" charset="0"/>
-              </a:rPr>
-              <a:t>grid</a:t>
-            </a:r>
-            <a:r>
-              <a:rPr lang="fr-CA" sz="4100" dirty="0">
-                <a:solidFill>
-                  <a:srgbClr val="00B0F0"/>
-                </a:solidFill>
-                <a:latin typeface="Calibri" panose="020F0502020204030204" pitchFamily="34" charset="0"/>
-              </a:rPr>
-              <a:t>-auto-flow</a:t>
-            </a:r>
-            <a:r>
-              <a:rPr lang="fr-CA" sz="4100" dirty="0">
-                <a:latin typeface="Calibri" panose="020F0502020204030204" pitchFamily="34" charset="0"/>
-              </a:rPr>
-              <a:t>: dense;</a:t>
-            </a:r>
-          </a:p>
-          <a:p>
-            <a:pPr marL="0" indent="0">
-              <a:buNone/>
-            </a:pPr>
-            <a:r>
-              <a:rPr lang="fr-CA" sz="4100" dirty="0">
-                <a:latin typeface="Calibri" panose="020F0502020204030204" pitchFamily="34" charset="0"/>
-              </a:rPr>
-              <a:t>}</a:t>
-            </a:r>
-          </a:p>
-          <a:p>
-            <a:pPr marL="0" indent="0">
-              <a:buNone/>
-            </a:pPr>
-            <a:br>
-              <a:rPr lang="fr-CA" sz="4100" dirty="0">
-                <a:latin typeface="Calibri" panose="020F0502020204030204" pitchFamily="34" charset="0"/>
-              </a:rPr>
-            </a:br>
-            <a:r>
-              <a:rPr lang="fr-CA" sz="4100" dirty="0">
-                <a:latin typeface="Calibri" panose="020F0502020204030204" pitchFamily="34" charset="0"/>
-              </a:rPr>
-              <a:t>.horizontal {</a:t>
-            </a:r>
-          </a:p>
-          <a:p>
-            <a:pPr marL="0" indent="0">
-              <a:buNone/>
-            </a:pPr>
-            <a:r>
-              <a:rPr lang="fr-CA" sz="4100" dirty="0">
-                <a:solidFill>
-                  <a:srgbClr val="00B0F0"/>
-                </a:solidFill>
-                <a:latin typeface="Calibri" panose="020F0502020204030204" pitchFamily="34" charset="0"/>
-              </a:rPr>
-              <a:t>	</a:t>
-            </a:r>
-            <a:r>
-              <a:rPr lang="fr-CA" sz="4100" dirty="0" err="1">
+              <a:rPr lang="fr-CA" sz="8000" dirty="0" err="1">
                 <a:solidFill>
                   <a:srgbClr val="00B0F0"/>
                 </a:solidFill>
@@ -10678,30 +10994,18 @@
               <a:t>grid-column</a:t>
             </a:r>
             <a:r>
-              <a:rPr lang="fr-CA" sz="4100" dirty="0">
-                <a:latin typeface="Calibri" panose="020F0502020204030204" pitchFamily="34" charset="0"/>
-              </a:rPr>
-              <a:t>: </a:t>
-            </a:r>
-            <a:r>
-              <a:rPr lang="fr-CA" sz="4100" dirty="0" err="1">
-                <a:latin typeface="Calibri" panose="020F0502020204030204" pitchFamily="34" charset="0"/>
-              </a:rPr>
-              <a:t>span</a:t>
-            </a:r>
-            <a:r>
-              <a:rPr lang="fr-CA" sz="4100" dirty="0">
-                <a:latin typeface="Calibri" panose="020F0502020204030204" pitchFamily="34" charset="0"/>
-              </a:rPr>
-              <a:t> 2;</a:t>
-            </a:r>
-          </a:p>
-          <a:p>
-            <a:pPr marL="0" indent="0">
-              <a:buNone/>
-            </a:pPr>
-            <a:r>
-              <a:rPr lang="fr-CA" sz="4100" dirty="0">
+              <a:rPr lang="fr-CA" sz="8000" dirty="0">
+                <a:latin typeface="Calibri" panose="020F0502020204030204" pitchFamily="34" charset="0"/>
+              </a:rPr>
+              <a:t>: 1 / -1;</a:t>
+            </a:r>
+          </a:p>
+          <a:p>
+            <a:pPr marL="0" lvl="0" indent="0">
+              <a:buNone/>
+            </a:pPr>
+            <a:r>
+              <a:rPr lang="fr-CA" sz="8000" dirty="0">
                 <a:latin typeface="Calibri" panose="020F0502020204030204" pitchFamily="34" charset="0"/>
               </a:rPr>
               <a:t>}</a:t>
@@ -10717,7 +11021,7 @@
           <p:cNvPr id="4" name="Espace réservé du contenu 3">
             <a:extLst>
               <a:ext uri="{FF2B5EF4-FFF2-40B4-BE49-F238E27FC236}">
-                <a16:creationId xmlns:a16="http://schemas.microsoft.com/office/drawing/2014/main" id="{A6075F6B-44F4-40AC-B977-763172916C1F}"/>
+                <a16:creationId xmlns:a16="http://schemas.microsoft.com/office/drawing/2014/main" id="{CC41EF5D-0998-4083-895A-7CDF177A7B49}"/>
               </a:ext>
             </a:extLst>
           </p:cNvPr>
@@ -10730,32 +11034,32 @@
         </p:nvSpPr>
         <p:spPr>
           <a:xfrm>
-            <a:off x="6763110" y="1431985"/>
-            <a:ext cx="5158596" cy="5296618"/>
+            <a:off x="6590581" y="1207697"/>
+            <a:ext cx="5342627" cy="5632048"/>
           </a:xfrm>
         </p:spPr>
         <p:txBody>
           <a:bodyPr>
-            <a:normAutofit fontScale="62500" lnSpcReduction="20000"/>
+            <a:normAutofit fontScale="32500" lnSpcReduction="20000"/>
           </a:bodyPr>
           <a:lstStyle/>
           <a:p>
-            <a:pPr marL="0" indent="0">
-              <a:buNone/>
-            </a:pPr>
-            <a:r>
-              <a:rPr lang="fr-CA" sz="4600" dirty="0">
-                <a:latin typeface="Calibri" panose="020F0502020204030204" pitchFamily="34" charset="0"/>
-              </a:rPr>
-              <a:t>.vertical {</a:t>
-            </a:r>
-          </a:p>
-          <a:p>
-            <a:pPr marL="0" indent="0">
-              <a:buNone/>
-            </a:pPr>
-            <a:r>
-              <a:rPr lang="fr-CA" sz="4600" dirty="0">
+            <a:pPr marL="0" lvl="0" indent="0">
+              <a:buNone/>
+            </a:pPr>
+            <a:r>
+              <a:rPr lang="fr-CA" sz="8600" dirty="0">
+                <a:latin typeface="Calibri" panose="020F0502020204030204" pitchFamily="34" charset="0"/>
+              </a:rPr>
+              <a:t>.menu {</a:t>
+            </a:r>
+          </a:p>
+          <a:p>
+            <a:pPr marL="0" lvl="0" indent="0">
+              <a:buNone/>
+            </a:pPr>
+            <a:r>
+              <a:rPr lang="fr-CA" sz="8600" dirty="0">
                 <a:solidFill>
                   <a:srgbClr val="00B0F0"/>
                 </a:solidFill>
@@ -10764,66 +11068,188 @@
               <a:t>	</a:t>
             </a:r>
             <a:r>
-              <a:rPr lang="fr-CA" sz="4600" dirty="0" err="1">
-                <a:solidFill>
-                  <a:srgbClr val="00B0F0"/>
-                </a:solidFill>
-                <a:latin typeface="Calibri" panose="020F0502020204030204" pitchFamily="34" charset="0"/>
-              </a:rPr>
-              <a:t>grid-row</a:t>
-            </a:r>
-            <a:r>
-              <a:rPr lang="fr-CA" sz="4600" dirty="0">
+              <a:rPr lang="fr-CA" sz="8600" dirty="0" err="1">
+                <a:solidFill>
+                  <a:srgbClr val="00B0F0"/>
+                </a:solidFill>
+                <a:latin typeface="Calibri" panose="020F0502020204030204" pitchFamily="34" charset="0"/>
+              </a:rPr>
+              <a:t>grid-column</a:t>
+            </a:r>
+            <a:r>
+              <a:rPr lang="fr-CA" sz="8600" b="1" dirty="0">
                 <a:latin typeface="Calibri" panose="020F0502020204030204" pitchFamily="34" charset="0"/>
               </a:rPr>
               <a:t>: </a:t>
             </a:r>
             <a:r>
-              <a:rPr lang="fr-CA" sz="4600" dirty="0" err="1">
-                <a:latin typeface="Calibri" panose="020F0502020204030204" pitchFamily="34" charset="0"/>
-              </a:rPr>
-              <a:t>span</a:t>
-            </a:r>
-            <a:r>
-              <a:rPr lang="fr-CA" sz="4600" dirty="0">
-                <a:latin typeface="Calibri" panose="020F0502020204030204" pitchFamily="34" charset="0"/>
-              </a:rPr>
-              <a:t> 2;</a:t>
-            </a:r>
-          </a:p>
-          <a:p>
-            <a:pPr marL="0" indent="0">
-              <a:buNone/>
-            </a:pPr>
-            <a:r>
-              <a:rPr lang="fr-CA" sz="4600" dirty="0">
+              <a:rPr lang="fr-CA" sz="8600" dirty="0">
+                <a:latin typeface="Calibri" panose="020F0502020204030204" pitchFamily="34" charset="0"/>
+              </a:rPr>
+              <a:t>1 / 3;}</a:t>
+            </a:r>
+          </a:p>
+          <a:p>
+            <a:pPr lvl="0"/>
+            <a:endParaRPr lang="fr-CA" sz="8600" dirty="0">
+              <a:latin typeface="Calibri" panose="020F0502020204030204" pitchFamily="34" charset="0"/>
+            </a:endParaRPr>
+          </a:p>
+          <a:p>
+            <a:pPr marL="0" lvl="0" indent="0">
+              <a:buNone/>
+            </a:pPr>
+            <a:r>
+              <a:rPr lang="fr-CA" sz="8600" dirty="0">
+                <a:latin typeface="Calibri" panose="020F0502020204030204" pitchFamily="34" charset="0"/>
+              </a:rPr>
+              <a:t>.content {</a:t>
+            </a:r>
+          </a:p>
+          <a:p>
+            <a:pPr marL="0" lvl="0" indent="0">
+              <a:buNone/>
+            </a:pPr>
+            <a:r>
+              <a:rPr lang="fr-CA" sz="8600" dirty="0">
+                <a:solidFill>
+                  <a:srgbClr val="00B0F0"/>
+                </a:solidFill>
+                <a:latin typeface="Calibri" panose="020F0502020204030204" pitchFamily="34" charset="0"/>
+              </a:rPr>
+              <a:t>	</a:t>
+            </a:r>
+            <a:r>
+              <a:rPr lang="fr-CA" sz="8600" dirty="0" err="1">
+                <a:solidFill>
+                  <a:srgbClr val="00B0F0"/>
+                </a:solidFill>
+                <a:latin typeface="Calibri" panose="020F0502020204030204" pitchFamily="34" charset="0"/>
+              </a:rPr>
+              <a:t>grid-column</a:t>
+            </a:r>
+            <a:r>
+              <a:rPr lang="fr-CA" sz="8600" dirty="0">
+                <a:latin typeface="Calibri" panose="020F0502020204030204" pitchFamily="34" charset="0"/>
+              </a:rPr>
+              <a:t>: 3 / -1;</a:t>
+            </a:r>
+          </a:p>
+          <a:p>
+            <a:pPr marL="0" lvl="0" indent="0">
+              <a:buNone/>
+            </a:pPr>
+            <a:r>
+              <a:rPr lang="fr-CA" sz="8600" dirty="0">
+                <a:latin typeface="Calibri" panose="020F0502020204030204" pitchFamily="34" charset="0"/>
+              </a:rPr>
+              <a:t>	// </a:t>
+            </a:r>
+            <a:r>
+              <a:rPr lang="fr-CA" sz="8600" dirty="0" err="1">
+                <a:solidFill>
+                  <a:srgbClr val="00B0F0"/>
+                </a:solidFill>
+                <a:latin typeface="Calibri" panose="020F0502020204030204" pitchFamily="34" charset="0"/>
+              </a:rPr>
+              <a:t>justify</a:t>
+            </a:r>
+            <a:r>
+              <a:rPr lang="fr-CA" sz="8600" dirty="0">
+                <a:solidFill>
+                  <a:srgbClr val="00B0F0"/>
+                </a:solidFill>
+                <a:latin typeface="Calibri" panose="020F0502020204030204" pitchFamily="34" charset="0"/>
+              </a:rPr>
+              <a:t>-self</a:t>
+            </a:r>
+            <a:r>
+              <a:rPr lang="fr-CA" sz="8600" dirty="0">
+                <a:latin typeface="Calibri" panose="020F0502020204030204" pitchFamily="34" charset="0"/>
+              </a:rPr>
+              <a:t>: center;</a:t>
+            </a:r>
+          </a:p>
+          <a:p>
+            <a:pPr marL="0" lvl="0" indent="0">
+              <a:buNone/>
+            </a:pPr>
+            <a:r>
+              <a:rPr lang="fr-CA" sz="8600" dirty="0">
+                <a:latin typeface="Calibri" panose="020F0502020204030204" pitchFamily="34" charset="0"/>
+              </a:rPr>
+              <a:t> 	// </a:t>
+            </a:r>
+            <a:r>
+              <a:rPr lang="fr-CA" sz="8600" dirty="0" err="1">
+                <a:solidFill>
+                  <a:srgbClr val="00B0F0"/>
+                </a:solidFill>
+                <a:latin typeface="Calibri" panose="020F0502020204030204" pitchFamily="34" charset="0"/>
+              </a:rPr>
+              <a:t>align</a:t>
+            </a:r>
+            <a:r>
+              <a:rPr lang="fr-CA" sz="8600" dirty="0">
+                <a:solidFill>
+                  <a:srgbClr val="00B0F0"/>
+                </a:solidFill>
+                <a:latin typeface="Calibri" panose="020F0502020204030204" pitchFamily="34" charset="0"/>
+              </a:rPr>
+              <a:t>-self</a:t>
+            </a:r>
+            <a:r>
+              <a:rPr lang="fr-CA" sz="8600" dirty="0">
+                <a:latin typeface="Calibri" panose="020F0502020204030204" pitchFamily="34" charset="0"/>
+              </a:rPr>
+              <a:t>: end;</a:t>
+            </a:r>
+          </a:p>
+          <a:p>
+            <a:pPr marL="0" lvl="0" indent="0">
+              <a:buNone/>
+            </a:pPr>
+            <a:r>
+              <a:rPr lang="fr-CA" sz="8600" dirty="0">
                 <a:latin typeface="Calibri" panose="020F0502020204030204" pitchFamily="34" charset="0"/>
               </a:rPr>
               <a:t>}</a:t>
             </a:r>
           </a:p>
           <a:p>
-            <a:pPr marL="0" indent="0">
+            <a:pPr marL="0" lvl="0" indent="0">
               <a:buNone/>
             </a:pPr>
             <a:br>
-              <a:rPr lang="fr-CA" sz="4600" dirty="0">
+              <a:rPr lang="fr-CA" sz="8600" dirty="0">
                 <a:latin typeface="Calibri" panose="020F0502020204030204" pitchFamily="34" charset="0"/>
               </a:rPr>
             </a:br>
             <a:r>
-              <a:rPr lang="fr-CA" sz="4600" dirty="0">
-                <a:latin typeface="Calibri" panose="020F0502020204030204" pitchFamily="34" charset="0"/>
-              </a:rPr>
-              <a:t>.big {</a:t>
-            </a:r>
-          </a:p>
-          <a:p>
-            <a:pPr marL="0" indent="0">
-              <a:buNone/>
-            </a:pPr>
-            <a:r>
-              <a:rPr lang="fr-CA" sz="4600" dirty="0">
+              <a:rPr lang="fr-CA" sz="8600" dirty="0">
+                <a:latin typeface="Calibri" panose="020F0502020204030204" pitchFamily="34" charset="0"/>
+              </a:rPr>
+              <a:t>.</a:t>
+            </a:r>
+            <a:r>
+              <a:rPr lang="fr-CA" sz="8600" dirty="0" err="1">
+                <a:latin typeface="Calibri" panose="020F0502020204030204" pitchFamily="34" charset="0"/>
+              </a:rPr>
+              <a:t>footer</a:t>
+            </a:r>
+            <a:r>
+              <a:rPr lang="fr-CA" sz="8600" dirty="0">
+                <a:latin typeface="Calibri" panose="020F0502020204030204" pitchFamily="34" charset="0"/>
+              </a:rPr>
+              <a:t> {</a:t>
+            </a:r>
+          </a:p>
+          <a:p>
+            <a:pPr marL="0" lvl="0" indent="0">
+              <a:buNone/>
+            </a:pPr>
+            <a:r>
+              <a:rPr lang="fr-CA" sz="8600" dirty="0">
                 <a:solidFill>
                   <a:srgbClr val="00B0F0"/>
                 </a:solidFill>
@@ -10832,7 +11258,7 @@
               <a:t>	</a:t>
             </a:r>
             <a:r>
-              <a:rPr lang="fr-CA" sz="4600" dirty="0" err="1">
+              <a:rPr lang="fr-CA" sz="8600" dirty="0" err="1">
                 <a:solidFill>
                   <a:srgbClr val="00B0F0"/>
                 </a:solidFill>
@@ -10841,74 +11267,18 @@
               <a:t>grid-column</a:t>
             </a:r>
             <a:r>
-              <a:rPr lang="fr-CA" sz="4600" dirty="0">
-                <a:solidFill>
-                  <a:srgbClr val="00B0F0"/>
-                </a:solidFill>
-                <a:latin typeface="Calibri" panose="020F0502020204030204" pitchFamily="34" charset="0"/>
-              </a:rPr>
-              <a:t>: </a:t>
-            </a:r>
-            <a:r>
-              <a:rPr lang="fr-CA" sz="4600" dirty="0" err="1">
-                <a:latin typeface="Calibri" panose="020F0502020204030204" pitchFamily="34" charset="0"/>
-              </a:rPr>
-              <a:t>span</a:t>
-            </a:r>
-            <a:r>
-              <a:rPr lang="fr-CA" sz="4600" dirty="0">
-                <a:latin typeface="Calibri" panose="020F0502020204030204" pitchFamily="34" charset="0"/>
-              </a:rPr>
-              <a:t> 2;</a:t>
-            </a:r>
-          </a:p>
-          <a:p>
-            <a:pPr marL="0" indent="0">
-              <a:buNone/>
-            </a:pPr>
-            <a:r>
-              <a:rPr lang="fr-CA" sz="4600" dirty="0">
-                <a:solidFill>
-                  <a:srgbClr val="00B0F0"/>
-                </a:solidFill>
-                <a:latin typeface="Calibri" panose="020F0502020204030204" pitchFamily="34" charset="0"/>
-              </a:rPr>
-              <a:t>	</a:t>
-            </a:r>
-            <a:r>
-              <a:rPr lang="fr-CA" sz="4600" dirty="0" err="1">
-                <a:solidFill>
-                  <a:srgbClr val="00B0F0"/>
-                </a:solidFill>
-                <a:latin typeface="Calibri" panose="020F0502020204030204" pitchFamily="34" charset="0"/>
-              </a:rPr>
-              <a:t>grid-row</a:t>
-            </a:r>
-            <a:r>
-              <a:rPr lang="fr-CA" sz="4600" dirty="0">
-                <a:latin typeface="Calibri" panose="020F0502020204030204" pitchFamily="34" charset="0"/>
-              </a:rPr>
-              <a:t>: </a:t>
-            </a:r>
-            <a:r>
-              <a:rPr lang="fr-CA" sz="4600" dirty="0" err="1">
-                <a:latin typeface="Calibri" panose="020F0502020204030204" pitchFamily="34" charset="0"/>
-              </a:rPr>
-              <a:t>span</a:t>
-            </a:r>
-            <a:r>
-              <a:rPr lang="fr-CA" sz="4600" dirty="0">
-                <a:latin typeface="Calibri" panose="020F0502020204030204" pitchFamily="34" charset="0"/>
-              </a:rPr>
-              <a:t> 2;</a:t>
-            </a:r>
-          </a:p>
-          <a:p>
-            <a:pPr marL="0" indent="0">
-              <a:buNone/>
-            </a:pPr>
-            <a:r>
-              <a:rPr lang="fr-CA" sz="4600" dirty="0">
+              <a:rPr lang="fr-CA" sz="8600" dirty="0">
+                <a:latin typeface="Calibri" panose="020F0502020204030204" pitchFamily="34" charset="0"/>
+              </a:rPr>
+              <a:t>: 1 / -1;</a:t>
+            </a:r>
+          </a:p>
+          <a:p>
+            <a:pPr marL="0" lvl="0" indent="0">
+              <a:buNone/>
+            </a:pPr>
+            <a:r>
+              <a:rPr lang="fr-CA" sz="8600" dirty="0">
                 <a:latin typeface="Calibri" panose="020F0502020204030204" pitchFamily="34" charset="0"/>
               </a:rPr>
               <a:t>}</a:t>
@@ -10922,7 +11292,7 @@
     </p:spTree>
     <p:extLst>
       <p:ext uri="{BB962C8B-B14F-4D97-AF65-F5344CB8AC3E}">
-        <p14:creationId xmlns:p14="http://schemas.microsoft.com/office/powerpoint/2010/main" val="1335371643"/>
+        <p14:creationId xmlns:p14="http://schemas.microsoft.com/office/powerpoint/2010/main" val="2424708951"/>
       </p:ext>
     </p:extLst>
   </p:cSld>

</xml_diff>